<commit_message>
updated mobilerobot-legend-color-blind-friendly.pptx and imgs/legend.png
</commit_message>
<xml_diff>
--- a/XPlanningEvaluation/data/legend/mobilerobot-legend-color-blind-friendly.pptx
+++ b/XPlanningEvaluation/data/legend/mobilerobot-legend-color-blind-friendly.pptx
@@ -197,7 +197,7 @@
           <a:p>
             <a:fld id="{AC1D5B16-E437-6343-9361-CFC6BDADB949}" type="datetimeFigureOut">
               <a:rPr lang="en-US" smtClean="0"/>
-              <a:t>8/27/19</a:t>
+              <a:t>9/9/19</a:t>
             </a:fld>
             <a:endParaRPr lang="en-US"/>
           </a:p>
@@ -508,23 +508,60 @@
           <a:bodyPr/>
           <a:lstStyle/>
           <a:p>
-            <a:pPr marL="171450" indent="-171450">
-              <a:buFont typeface="Arial" panose="020B0604020202020204" pitchFamily="34" charset="0"/>
-              <a:buChar char="•"/>
-            </a:pPr>
             <a:r>
               <a:rPr lang="en-US" dirty="0"/>
-              <a:t>Full speed -&gt; ”Blue”; RGB = (0, 114, 178); Hex = #0072b2</a:t>
-            </a:r>
-          </a:p>
-          <a:p>
-            <a:pPr marL="171450" indent="-171450">
-              <a:buFont typeface="Arial" panose="020B0604020202020204" pitchFamily="34" charset="0"/>
-              <a:buChar char="•"/>
-            </a:pPr>
+              <a:t>”Green”; </a:t>
+            </a:r>
+            <a:r>
+              <a:rPr lang="en-US" dirty="0" err="1"/>
+              <a:t>rgb</a:t>
+            </a:r>
             <a:r>
               <a:rPr lang="en-US" dirty="0"/>
-              <a:t>Half speed -&gt; “Sky blue”; RBG = (86, 180, 233); Hex = #</a:t>
+              <a:t>=(0,255,0); hex=#00FF00</a:t>
+            </a:r>
+          </a:p>
+          <a:p>
+            <a:r>
+              <a:rPr lang="en-US" dirty="0"/>
+              <a:t>“Yellow”; </a:t>
+            </a:r>
+            <a:r>
+              <a:rPr lang="en-US" dirty="0" err="1"/>
+              <a:t>rgb</a:t>
+            </a:r>
+            <a:r>
+              <a:rPr lang="en-US" dirty="0"/>
+              <a:t>=(255,255,0); hex=#FFFF00</a:t>
+            </a:r>
+          </a:p>
+          <a:p>
+            <a:r>
+              <a:rPr lang="en-US" dirty="0"/>
+              <a:t>“Red”; </a:t>
+            </a:r>
+            <a:r>
+              <a:rPr lang="en-US" dirty="0" err="1"/>
+              <a:t>rgb</a:t>
+            </a:r>
+            <a:r>
+              <a:rPr lang="en-US" dirty="0"/>
+              <a:t>=(255,0,0); hex=#FF0000</a:t>
+            </a:r>
+          </a:p>
+          <a:p>
+            <a:endParaRPr lang="en-US" dirty="0"/>
+          </a:p>
+          <a:p>
+            <a:r>
+              <a:rPr lang="en-US" dirty="0"/>
+              <a:t>”Blue”; RGB = (0, 0, 255); Hex = #0000ff</a:t>
+            </a:r>
+          </a:p>
+          <a:p>
+            <a:r>
+              <a:rPr lang="en-US" dirty="0"/>
+              <a:t>“Sky blue”; RBG = (135, 206, 235); Hex = #</a:t>
             </a:r>
             <a:r>
               <a:rPr lang="en-US" sz="1200" b="0" i="0" kern="1200" dirty="0">
@@ -536,81 +573,11 @@
                 <a:ea typeface="+mn-ea"/>
                 <a:cs typeface="+mn-cs"/>
               </a:rPr>
-              <a:t>56b4e9</a:t>
-            </a:r>
-          </a:p>
-          <a:p>
-            <a:pPr marL="171450" indent="-171450">
-              <a:buFont typeface="Arial" panose="020B0604020202020204" pitchFamily="34" charset="0"/>
-              <a:buChar char="•"/>
-            </a:pPr>
-            <a:endParaRPr lang="en-US" sz="1200" b="0" i="0" kern="1200" dirty="0">
-              <a:solidFill>
-                <a:schemeClr val="tx1"/>
-              </a:solidFill>
-              <a:effectLst/>
-              <a:latin typeface="+mn-lt"/>
-              <a:ea typeface="+mn-ea"/>
-              <a:cs typeface="+mn-cs"/>
-            </a:endParaRPr>
-          </a:p>
-          <a:p>
-            <a:pPr marL="171450" indent="-171450">
-              <a:buFont typeface="Arial" panose="020B0604020202020204" pitchFamily="34" charset="0"/>
-              <a:buChar char="•"/>
-            </a:pPr>
-            <a:r>
-              <a:rPr lang="en-US" dirty="0"/>
-              <a:t>Private area: “Vermillion”; RGB = (213, 94, 0); Hex = #</a:t>
-            </a:r>
-            <a:r>
-              <a:rPr lang="en-US" sz="1200" b="0" i="0" kern="1200" dirty="0">
-                <a:solidFill>
-                  <a:schemeClr val="tx1"/>
-                </a:solidFill>
-                <a:effectLst/>
-                <a:latin typeface="+mn-lt"/>
-                <a:ea typeface="+mn-ea"/>
-                <a:cs typeface="+mn-cs"/>
-              </a:rPr>
-              <a:t>d55e00</a:t>
-            </a:r>
-          </a:p>
-          <a:p>
-            <a:pPr marL="171450" indent="-171450">
-              <a:buFont typeface="Arial" panose="020B0604020202020204" pitchFamily="34" charset="0"/>
-              <a:buChar char="•"/>
-            </a:pPr>
-            <a:r>
-              <a:rPr lang="en-US" sz="1200" b="0" i="0" kern="1200" dirty="0">
-                <a:solidFill>
-                  <a:schemeClr val="tx1"/>
-                </a:solidFill>
-                <a:effectLst/>
-                <a:latin typeface="+mn-lt"/>
-                <a:ea typeface="+mn-ea"/>
-                <a:cs typeface="+mn-cs"/>
-              </a:rPr>
-              <a:t>Semi-private area: “Yellow”; RGB = (240, 228, 66); Hex = #f0e442</a:t>
-            </a:r>
-          </a:p>
-          <a:p>
-            <a:pPr marL="171450" indent="-171450">
-              <a:buFont typeface="Arial" panose="020B0604020202020204" pitchFamily="34" charset="0"/>
-              <a:buChar char="•"/>
-            </a:pPr>
-            <a:r>
-              <a:rPr lang="en-US" sz="1200" b="0" i="0" kern="1200" dirty="0">
-                <a:solidFill>
-                  <a:schemeClr val="tx1"/>
-                </a:solidFill>
-                <a:effectLst/>
-                <a:latin typeface="+mn-lt"/>
-                <a:ea typeface="+mn-ea"/>
-                <a:cs typeface="+mn-cs"/>
-              </a:rPr>
-              <a:t>Public area: “Bluish green”; RGB = (0, 158, 115); Hex = #009e73</a:t>
-            </a:r>
+              <a:t>87ceeb</a:t>
+            </a:r>
+            <a:endParaRPr lang="en-US" dirty="0"/>
+          </a:p>
+          <a:p>
             <a:endParaRPr lang="en-US" dirty="0"/>
           </a:p>
         </p:txBody>
@@ -782,7 +749,7 @@
           <a:p>
             <a:fld id="{117BC45A-752C-174D-BFB4-5EE0276A99CB}" type="datetimeFigureOut">
               <a:rPr lang="en-US" smtClean="0"/>
-              <a:t>8/27/19</a:t>
+              <a:t>9/9/19</a:t>
             </a:fld>
             <a:endParaRPr lang="en-US"/>
           </a:p>
@@ -952,7 +919,7 @@
           <a:p>
             <a:fld id="{117BC45A-752C-174D-BFB4-5EE0276A99CB}" type="datetimeFigureOut">
               <a:rPr lang="en-US" smtClean="0"/>
-              <a:t>8/27/19</a:t>
+              <a:t>9/9/19</a:t>
             </a:fld>
             <a:endParaRPr lang="en-US"/>
           </a:p>
@@ -1132,7 +1099,7 @@
           <a:p>
             <a:fld id="{117BC45A-752C-174D-BFB4-5EE0276A99CB}" type="datetimeFigureOut">
               <a:rPr lang="en-US" smtClean="0"/>
-              <a:t>8/27/19</a:t>
+              <a:t>9/9/19</a:t>
             </a:fld>
             <a:endParaRPr lang="en-US"/>
           </a:p>
@@ -1302,7 +1269,7 @@
           <a:p>
             <a:fld id="{117BC45A-752C-174D-BFB4-5EE0276A99CB}" type="datetimeFigureOut">
               <a:rPr lang="en-US" smtClean="0"/>
-              <a:t>8/27/19</a:t>
+              <a:t>9/9/19</a:t>
             </a:fld>
             <a:endParaRPr lang="en-US"/>
           </a:p>
@@ -1546,7 +1513,7 @@
           <a:p>
             <a:fld id="{117BC45A-752C-174D-BFB4-5EE0276A99CB}" type="datetimeFigureOut">
               <a:rPr lang="en-US" smtClean="0"/>
-              <a:t>8/27/19</a:t>
+              <a:t>9/9/19</a:t>
             </a:fld>
             <a:endParaRPr lang="en-US"/>
           </a:p>
@@ -1778,7 +1745,7 @@
           <a:p>
             <a:fld id="{117BC45A-752C-174D-BFB4-5EE0276A99CB}" type="datetimeFigureOut">
               <a:rPr lang="en-US" smtClean="0"/>
-              <a:t>8/27/19</a:t>
+              <a:t>9/9/19</a:t>
             </a:fld>
             <a:endParaRPr lang="en-US"/>
           </a:p>
@@ -2145,7 +2112,7 @@
           <a:p>
             <a:fld id="{117BC45A-752C-174D-BFB4-5EE0276A99CB}" type="datetimeFigureOut">
               <a:rPr lang="en-US" smtClean="0"/>
-              <a:t>8/27/19</a:t>
+              <a:t>9/9/19</a:t>
             </a:fld>
             <a:endParaRPr lang="en-US"/>
           </a:p>
@@ -2263,7 +2230,7 @@
           <a:p>
             <a:fld id="{117BC45A-752C-174D-BFB4-5EE0276A99CB}" type="datetimeFigureOut">
               <a:rPr lang="en-US" smtClean="0"/>
-              <a:t>8/27/19</a:t>
+              <a:t>9/9/19</a:t>
             </a:fld>
             <a:endParaRPr lang="en-US"/>
           </a:p>
@@ -2358,7 +2325,7 @@
           <a:p>
             <a:fld id="{117BC45A-752C-174D-BFB4-5EE0276A99CB}" type="datetimeFigureOut">
               <a:rPr lang="en-US" smtClean="0"/>
-              <a:t>8/27/19</a:t>
+              <a:t>9/9/19</a:t>
             </a:fld>
             <a:endParaRPr lang="en-US"/>
           </a:p>
@@ -2635,7 +2602,7 @@
           <a:p>
             <a:fld id="{117BC45A-752C-174D-BFB4-5EE0276A99CB}" type="datetimeFigureOut">
               <a:rPr lang="en-US" smtClean="0"/>
-              <a:t>8/27/19</a:t>
+              <a:t>9/9/19</a:t>
             </a:fld>
             <a:endParaRPr lang="en-US"/>
           </a:p>
@@ -2892,7 +2859,7 @@
           <a:p>
             <a:fld id="{117BC45A-752C-174D-BFB4-5EE0276A99CB}" type="datetimeFigureOut">
               <a:rPr lang="en-US" smtClean="0"/>
-              <a:t>8/27/19</a:t>
+              <a:t>9/9/19</a:t>
             </a:fld>
             <a:endParaRPr lang="en-US"/>
           </a:p>
@@ -3105,7 +3072,7 @@
           <a:p>
             <a:fld id="{117BC45A-752C-174D-BFB4-5EE0276A99CB}" type="datetimeFigureOut">
               <a:rPr lang="en-US" smtClean="0"/>
-              <a:t>8/27/19</a:t>
+              <a:t>9/9/19</a:t>
             </a:fld>
             <a:endParaRPr lang="en-US"/>
           </a:p>
@@ -3564,10 +3531,10 @@
       </p:sp>
       <p:grpSp>
         <p:nvGrpSpPr>
-          <p:cNvPr id="3" name="Group 2">
+          <p:cNvPr id="4" name="Group 3">
             <a:extLst>
               <a:ext uri="{FF2B5EF4-FFF2-40B4-BE49-F238E27FC236}">
-                <a16:creationId xmlns:a16="http://schemas.microsoft.com/office/drawing/2014/main" id="{465E60E2-12AE-AA48-A220-7700AB8BB0E0}"/>
+                <a16:creationId xmlns:a16="http://schemas.microsoft.com/office/drawing/2014/main" id="{FDAA7028-CF69-4846-B72B-B94B8C219060}"/>
               </a:ext>
             </a:extLst>
           </p:cNvPr>
@@ -3577,347 +3544,102 @@
         <p:grpSpPr>
           <a:xfrm>
             <a:off x="661428" y="1054666"/>
-            <a:ext cx="4989017" cy="2902172"/>
-            <a:chOff x="661428" y="1239157"/>
-            <a:chExt cx="4989017" cy="2902172"/>
+            <a:ext cx="3620181" cy="731520"/>
+            <a:chOff x="661429" y="958533"/>
+            <a:chExt cx="3620181" cy="731520"/>
           </a:xfrm>
         </p:grpSpPr>
-        <p:grpSp>
-          <p:nvGrpSpPr>
-            <p:cNvPr id="4" name="Group 3">
+        <p:sp>
+          <p:nvSpPr>
+            <p:cNvPr id="11" name="Oval 10">
               <a:extLst>
                 <a:ext uri="{FF2B5EF4-FFF2-40B4-BE49-F238E27FC236}">
-                  <a16:creationId xmlns:a16="http://schemas.microsoft.com/office/drawing/2014/main" id="{FDAA7028-CF69-4846-B72B-B94B8C219060}"/>
+                  <a16:creationId xmlns:a16="http://schemas.microsoft.com/office/drawing/2014/main" id="{E01F7E7F-076B-A644-8B63-BA7CED9064DD}"/>
                 </a:ext>
               </a:extLst>
             </p:cNvPr>
-            <p:cNvGrpSpPr/>
+            <p:cNvSpPr>
+              <a:spLocks noChangeAspect="1"/>
+            </p:cNvSpPr>
             <p:nvPr/>
-          </p:nvGrpSpPr>
-          <p:grpSpPr>
+          </p:nvSpPr>
+          <p:spPr>
             <a:xfrm>
-              <a:off x="661428" y="1239157"/>
-              <a:ext cx="3620181" cy="731520"/>
-              <a:chOff x="661429" y="958533"/>
-              <a:chExt cx="3620181" cy="731520"/>
+              <a:off x="661429" y="958533"/>
+              <a:ext cx="731506" cy="731520"/>
             </a:xfrm>
-          </p:grpSpPr>
-          <p:sp>
-            <p:nvSpPr>
-              <p:cNvPr id="11" name="Oval 10">
-                <a:extLst>
-                  <a:ext uri="{FF2B5EF4-FFF2-40B4-BE49-F238E27FC236}">
-                    <a16:creationId xmlns:a16="http://schemas.microsoft.com/office/drawing/2014/main" id="{E01F7E7F-076B-A644-8B63-BA7CED9064DD}"/>
-                  </a:ext>
-                </a:extLst>
-              </p:cNvPr>
-              <p:cNvSpPr>
-                <a:spLocks noChangeAspect="1"/>
-              </p:cNvSpPr>
-              <p:nvPr/>
-            </p:nvSpPr>
-            <p:spPr>
-              <a:xfrm>
-                <a:off x="661429" y="958533"/>
-                <a:ext cx="731506" cy="731520"/>
-              </a:xfrm>
-              <a:prstGeom prst="ellipse">
-                <a:avLst/>
-              </a:prstGeom>
+            <a:prstGeom prst="ellipse">
+              <a:avLst/>
+            </a:prstGeom>
+            <a:solidFill>
+              <a:srgbClr val="00FF00"/>
+            </a:solidFill>
+            <a:ln w="19050">
               <a:solidFill>
-                <a:srgbClr val="009E73"/>
+                <a:schemeClr val="tx1"/>
               </a:solidFill>
-              <a:ln>
-                <a:solidFill>
-                  <a:schemeClr val="tx1"/>
-                </a:solidFill>
-              </a:ln>
-            </p:spPr>
-            <p:style>
-              <a:lnRef idx="2">
-                <a:schemeClr val="accent1">
-                  <a:shade val="50000"/>
-                </a:schemeClr>
-              </a:lnRef>
-              <a:fillRef idx="1">
-                <a:schemeClr val="accent1"/>
-              </a:fillRef>
-              <a:effectRef idx="0">
-                <a:schemeClr val="accent1"/>
-              </a:effectRef>
-              <a:fontRef idx="minor">
-                <a:schemeClr val="lt1"/>
-              </a:fontRef>
-            </p:style>
-            <p:txBody>
-              <a:bodyPr rtlCol="0" anchor="ctr"/>
-              <a:lstStyle/>
-              <a:p>
-                <a:pPr algn="ctr"/>
-                <a:endParaRPr lang="en-US" sz="9783" dirty="0"/>
-              </a:p>
-            </p:txBody>
-          </p:sp>
-          <p:sp>
-            <p:nvSpPr>
-              <p:cNvPr id="12" name="TextBox 11">
-                <a:extLst>
-                  <a:ext uri="{FF2B5EF4-FFF2-40B4-BE49-F238E27FC236}">
-                    <a16:creationId xmlns:a16="http://schemas.microsoft.com/office/drawing/2014/main" id="{F907125B-B62E-1149-8788-4328CC08D9A9}"/>
-                  </a:ext>
-                </a:extLst>
-              </p:cNvPr>
-              <p:cNvSpPr txBox="1"/>
-              <p:nvPr/>
-            </p:nvSpPr>
-            <p:spPr>
-              <a:xfrm>
-                <a:off x="1758483" y="970350"/>
-                <a:ext cx="2523127" cy="707886"/>
-              </a:xfrm>
-              <a:prstGeom prst="rect">
-                <a:avLst/>
-              </a:prstGeom>
-              <a:noFill/>
-            </p:spPr>
-            <p:txBody>
-              <a:bodyPr wrap="none" rtlCol="0">
-                <a:spAutoFit/>
-              </a:bodyPr>
-              <a:lstStyle/>
-              <a:p>
-                <a:r>
-                  <a:rPr lang="en-US" sz="4000" dirty="0"/>
-                  <a:t>Public Area</a:t>
-                </a:r>
-              </a:p>
-            </p:txBody>
-          </p:sp>
-        </p:grpSp>
-        <p:grpSp>
-          <p:nvGrpSpPr>
-            <p:cNvPr id="5" name="Group 4">
+            </a:ln>
+          </p:spPr>
+          <p:style>
+            <a:lnRef idx="2">
+              <a:schemeClr val="accent1">
+                <a:shade val="50000"/>
+              </a:schemeClr>
+            </a:lnRef>
+            <a:fillRef idx="1">
+              <a:schemeClr val="accent1"/>
+            </a:fillRef>
+            <a:effectRef idx="0">
+              <a:schemeClr val="accent1"/>
+            </a:effectRef>
+            <a:fontRef idx="minor">
+              <a:schemeClr val="lt1"/>
+            </a:fontRef>
+          </p:style>
+          <p:txBody>
+            <a:bodyPr rtlCol="0" anchor="ctr"/>
+            <a:lstStyle/>
+            <a:p>
+              <a:pPr algn="ctr"/>
+              <a:endParaRPr lang="en-US" sz="9783" dirty="0"/>
+            </a:p>
+          </p:txBody>
+        </p:sp>
+        <p:sp>
+          <p:nvSpPr>
+            <p:cNvPr id="12" name="TextBox 11">
               <a:extLst>
                 <a:ext uri="{FF2B5EF4-FFF2-40B4-BE49-F238E27FC236}">
-                  <a16:creationId xmlns:a16="http://schemas.microsoft.com/office/drawing/2014/main" id="{70DE7DB6-607E-E649-BC36-C604518D2C6C}"/>
+                  <a16:creationId xmlns:a16="http://schemas.microsoft.com/office/drawing/2014/main" id="{F907125B-B62E-1149-8788-4328CC08D9A9}"/>
                 </a:ext>
               </a:extLst>
             </p:cNvPr>
-            <p:cNvGrpSpPr/>
+            <p:cNvSpPr txBox="1"/>
             <p:nvPr/>
-          </p:nvGrpSpPr>
-          <p:grpSpPr>
+          </p:nvSpPr>
+          <p:spPr>
             <a:xfrm>
-              <a:off x="661429" y="2324483"/>
-              <a:ext cx="4989016" cy="731520"/>
-              <a:chOff x="661429" y="2166735"/>
-              <a:chExt cx="4989016" cy="731520"/>
+              <a:off x="1758483" y="970350"/>
+              <a:ext cx="2523127" cy="707886"/>
             </a:xfrm>
-          </p:grpSpPr>
-          <p:sp>
-            <p:nvSpPr>
-              <p:cNvPr id="9" name="Oval 8">
-                <a:extLst>
-                  <a:ext uri="{FF2B5EF4-FFF2-40B4-BE49-F238E27FC236}">
-                    <a16:creationId xmlns:a16="http://schemas.microsoft.com/office/drawing/2014/main" id="{FAD30923-9673-C94F-A81A-1FF40F46F9A1}"/>
-                  </a:ext>
-                </a:extLst>
-              </p:cNvPr>
-              <p:cNvSpPr>
-                <a:spLocks noChangeAspect="1"/>
-              </p:cNvSpPr>
-              <p:nvPr/>
-            </p:nvSpPr>
-            <p:spPr>
-              <a:xfrm>
-                <a:off x="661429" y="2166735"/>
-                <a:ext cx="731520" cy="731520"/>
-              </a:xfrm>
-              <a:prstGeom prst="ellipse">
-                <a:avLst/>
-              </a:prstGeom>
-              <a:solidFill>
-                <a:srgbClr val="F0E442"/>
-              </a:solidFill>
-              <a:ln>
-                <a:solidFill>
-                  <a:schemeClr val="tx1"/>
-                </a:solidFill>
-              </a:ln>
-            </p:spPr>
-            <p:style>
-              <a:lnRef idx="2">
-                <a:schemeClr val="accent1">
-                  <a:shade val="50000"/>
-                </a:schemeClr>
-              </a:lnRef>
-              <a:fillRef idx="1">
-                <a:schemeClr val="accent1"/>
-              </a:fillRef>
-              <a:effectRef idx="0">
-                <a:schemeClr val="accent1"/>
-              </a:effectRef>
-              <a:fontRef idx="minor">
-                <a:schemeClr val="lt1"/>
-              </a:fontRef>
-            </p:style>
-            <p:txBody>
-              <a:bodyPr rtlCol="0" anchor="ctr"/>
-              <a:lstStyle/>
-              <a:p>
-                <a:pPr algn="ctr"/>
-                <a:endParaRPr lang="en-US" sz="9783"/>
-              </a:p>
-            </p:txBody>
-          </p:sp>
-          <p:sp>
-            <p:nvSpPr>
-              <p:cNvPr id="10" name="TextBox 9">
-                <a:extLst>
-                  <a:ext uri="{FF2B5EF4-FFF2-40B4-BE49-F238E27FC236}">
-                    <a16:creationId xmlns:a16="http://schemas.microsoft.com/office/drawing/2014/main" id="{92107F56-CB54-F649-9DDF-D5B892E337C2}"/>
-                  </a:ext>
-                </a:extLst>
-              </p:cNvPr>
-              <p:cNvSpPr txBox="1"/>
-              <p:nvPr/>
-            </p:nvSpPr>
-            <p:spPr>
-              <a:xfrm>
-                <a:off x="1758482" y="2178552"/>
-                <a:ext cx="3891963" cy="707886"/>
-              </a:xfrm>
-              <a:prstGeom prst="rect">
-                <a:avLst/>
-              </a:prstGeom>
-              <a:noFill/>
-            </p:spPr>
-            <p:txBody>
-              <a:bodyPr wrap="none" rtlCol="0">
-                <a:spAutoFit/>
-              </a:bodyPr>
-              <a:lstStyle/>
-              <a:p>
-                <a:r>
-                  <a:rPr lang="en-US" sz="4000" dirty="0"/>
-                  <a:t>Semi-Private Area</a:t>
-                </a:r>
-              </a:p>
-            </p:txBody>
-          </p:sp>
-        </p:grpSp>
-        <p:grpSp>
-          <p:nvGrpSpPr>
-            <p:cNvPr id="6" name="Group 5">
-              <a:extLst>
-                <a:ext uri="{FF2B5EF4-FFF2-40B4-BE49-F238E27FC236}">
-                  <a16:creationId xmlns:a16="http://schemas.microsoft.com/office/drawing/2014/main" id="{A82EE53B-2BE7-CD41-9429-E20176B16F41}"/>
-                </a:ext>
-              </a:extLst>
-            </p:cNvPr>
-            <p:cNvGrpSpPr/>
-            <p:nvPr/>
-          </p:nvGrpSpPr>
-          <p:grpSpPr>
-            <a:xfrm>
-              <a:off x="661428" y="3409809"/>
-              <a:ext cx="3814016" cy="731520"/>
-              <a:chOff x="661428" y="3269591"/>
-              <a:chExt cx="3814016" cy="731520"/>
-            </a:xfrm>
-          </p:grpSpPr>
-          <p:sp>
-            <p:nvSpPr>
-              <p:cNvPr id="7" name="Oval 6">
-                <a:extLst>
-                  <a:ext uri="{FF2B5EF4-FFF2-40B4-BE49-F238E27FC236}">
-                    <a16:creationId xmlns:a16="http://schemas.microsoft.com/office/drawing/2014/main" id="{75D9631F-24D2-E148-90BF-1D54E44431AD}"/>
-                  </a:ext>
-                </a:extLst>
-              </p:cNvPr>
-              <p:cNvSpPr>
-                <a:spLocks noChangeAspect="1"/>
-              </p:cNvSpPr>
-              <p:nvPr/>
-            </p:nvSpPr>
-            <p:spPr>
-              <a:xfrm>
-                <a:off x="661428" y="3269591"/>
-                <a:ext cx="731513" cy="731520"/>
-              </a:xfrm>
-              <a:prstGeom prst="ellipse">
-                <a:avLst/>
-              </a:prstGeom>
-              <a:solidFill>
-                <a:srgbClr val="D55E00"/>
-              </a:solidFill>
-              <a:ln>
-                <a:solidFill>
-                  <a:schemeClr val="tx1"/>
-                </a:solidFill>
-              </a:ln>
-            </p:spPr>
-            <p:style>
-              <a:lnRef idx="2">
-                <a:schemeClr val="accent1">
-                  <a:shade val="50000"/>
-                </a:schemeClr>
-              </a:lnRef>
-              <a:fillRef idx="1">
-                <a:schemeClr val="accent1"/>
-              </a:fillRef>
-              <a:effectRef idx="0">
-                <a:schemeClr val="accent1"/>
-              </a:effectRef>
-              <a:fontRef idx="minor">
-                <a:schemeClr val="lt1"/>
-              </a:fontRef>
-            </p:style>
-            <p:txBody>
-              <a:bodyPr rtlCol="0" anchor="ctr"/>
-              <a:lstStyle/>
-              <a:p>
-                <a:pPr algn="ctr"/>
-                <a:endParaRPr lang="en-US" sz="9783"/>
-              </a:p>
-            </p:txBody>
-          </p:sp>
-          <p:sp>
-            <p:nvSpPr>
-              <p:cNvPr id="8" name="TextBox 7">
-                <a:extLst>
-                  <a:ext uri="{FF2B5EF4-FFF2-40B4-BE49-F238E27FC236}">
-                    <a16:creationId xmlns:a16="http://schemas.microsoft.com/office/drawing/2014/main" id="{C1461940-5499-EF41-80BF-C686DD88264C}"/>
-                  </a:ext>
-                </a:extLst>
-              </p:cNvPr>
-              <p:cNvSpPr txBox="1"/>
-              <p:nvPr/>
-            </p:nvSpPr>
-            <p:spPr>
-              <a:xfrm>
-                <a:off x="1758482" y="3281408"/>
-                <a:ext cx="2716962" cy="707886"/>
-              </a:xfrm>
-              <a:prstGeom prst="rect">
-                <a:avLst/>
-              </a:prstGeom>
-              <a:noFill/>
-            </p:spPr>
-            <p:txBody>
-              <a:bodyPr wrap="none" rtlCol="0">
-                <a:spAutoFit/>
-              </a:bodyPr>
-              <a:lstStyle/>
-              <a:p>
-                <a:r>
-                  <a:rPr lang="en-US" sz="4000" dirty="0"/>
-                  <a:t>Private Area</a:t>
-                </a:r>
-              </a:p>
-            </p:txBody>
-          </p:sp>
-        </p:grpSp>
+            <a:prstGeom prst="rect">
+              <a:avLst/>
+            </a:prstGeom>
+            <a:noFill/>
+          </p:spPr>
+          <p:txBody>
+            <a:bodyPr wrap="none" rtlCol="0">
+              <a:spAutoFit/>
+            </a:bodyPr>
+            <a:lstStyle/>
+            <a:p>
+              <a:r>
+                <a:rPr lang="en-US" sz="4000" dirty="0"/>
+                <a:t>Public Area</a:t>
+              </a:r>
+            </a:p>
+          </p:txBody>
+        </p:sp>
       </p:grpSp>
       <p:grpSp>
         <p:nvGrpSpPr>
@@ -4391,10 +4113,10 @@
       </p:sp>
       <p:grpSp>
         <p:nvGrpSpPr>
-          <p:cNvPr id="15" name="Group 14">
+          <p:cNvPr id="28" name="Group 27">
             <a:extLst>
               <a:ext uri="{FF2B5EF4-FFF2-40B4-BE49-F238E27FC236}">
-                <a16:creationId xmlns:a16="http://schemas.microsoft.com/office/drawing/2014/main" id="{B81DDAB9-E14A-4B4B-89CD-14F1630E2133}"/>
+                <a16:creationId xmlns:a16="http://schemas.microsoft.com/office/drawing/2014/main" id="{4E559C0C-901F-874C-89A9-10E702E67204}"/>
               </a:ext>
             </a:extLst>
           </p:cNvPr>
@@ -4403,570 +4125,18 @@
         </p:nvGrpSpPr>
         <p:grpSpPr>
           <a:xfrm>
-            <a:off x="403017" y="13994695"/>
-            <a:ext cx="6871793" cy="6181981"/>
-            <a:chOff x="403017" y="13994695"/>
-            <a:chExt cx="6871793" cy="6181981"/>
+            <a:off x="403026" y="15048834"/>
+            <a:ext cx="5661823" cy="1323439"/>
+            <a:chOff x="403026" y="15801450"/>
+            <a:chExt cx="5661823" cy="1323439"/>
           </a:xfrm>
         </p:grpSpPr>
-        <p:grpSp>
-          <p:nvGrpSpPr>
-            <p:cNvPr id="28" name="Group 27">
+        <p:sp>
+          <p:nvSpPr>
+            <p:cNvPr id="40" name="TextBox 39">
               <a:extLst>
                 <a:ext uri="{FF2B5EF4-FFF2-40B4-BE49-F238E27FC236}">
-                  <a16:creationId xmlns:a16="http://schemas.microsoft.com/office/drawing/2014/main" id="{4E559C0C-901F-874C-89A9-10E702E67204}"/>
-                </a:ext>
-              </a:extLst>
-            </p:cNvPr>
-            <p:cNvGrpSpPr/>
-            <p:nvPr/>
-          </p:nvGrpSpPr>
-          <p:grpSpPr>
-            <a:xfrm>
-              <a:off x="403026" y="15048834"/>
-              <a:ext cx="5661823" cy="1323439"/>
-              <a:chOff x="403026" y="15801450"/>
-              <a:chExt cx="5661823" cy="1323439"/>
-            </a:xfrm>
-          </p:grpSpPr>
-          <p:sp>
-            <p:nvSpPr>
-              <p:cNvPr id="40" name="TextBox 39">
-                <a:extLst>
-                  <a:ext uri="{FF2B5EF4-FFF2-40B4-BE49-F238E27FC236}">
-                    <a16:creationId xmlns:a16="http://schemas.microsoft.com/office/drawing/2014/main" id="{6CDE2851-9997-6F49-B5AA-5438782D41A9}"/>
-                  </a:ext>
-                </a:extLst>
-              </p:cNvPr>
-              <p:cNvSpPr txBox="1"/>
-              <p:nvPr/>
-            </p:nvSpPr>
-            <p:spPr>
-              <a:xfrm>
-                <a:off x="3049408" y="15801450"/>
-                <a:ext cx="3015441" cy="1323439"/>
-              </a:xfrm>
-              <a:prstGeom prst="rect">
-                <a:avLst/>
-              </a:prstGeom>
-              <a:noFill/>
-            </p:spPr>
-            <p:txBody>
-              <a:bodyPr wrap="none" rtlCol="0">
-                <a:spAutoFit/>
-              </a:bodyPr>
-              <a:lstStyle/>
-              <a:p>
-                <a:r>
-                  <a:rPr lang="en-US" sz="4000" dirty="0"/>
-                  <a:t>Non-intrusive</a:t>
-                </a:r>
-              </a:p>
-              <a:p>
-                <a:r>
-                  <a:rPr lang="en-US" sz="4000" dirty="0"/>
-                  <a:t>(penalty = 0)</a:t>
-                </a:r>
-              </a:p>
-            </p:txBody>
-          </p:sp>
-          <p:grpSp>
-            <p:nvGrpSpPr>
-              <p:cNvPr id="41" name="Group 40">
-                <a:extLst>
-                  <a:ext uri="{FF2B5EF4-FFF2-40B4-BE49-F238E27FC236}">
-                    <a16:creationId xmlns:a16="http://schemas.microsoft.com/office/drawing/2014/main" id="{A4A081D4-12E2-D54F-BBC6-8DFFF42DE7C7}"/>
-                  </a:ext>
-                </a:extLst>
-              </p:cNvPr>
-              <p:cNvGrpSpPr/>
-              <p:nvPr/>
-            </p:nvGrpSpPr>
-            <p:grpSpPr>
-              <a:xfrm>
-                <a:off x="403026" y="16097410"/>
-                <a:ext cx="1981582" cy="731519"/>
-                <a:chOff x="403026" y="16830524"/>
-                <a:chExt cx="1981582" cy="731519"/>
-              </a:xfrm>
-            </p:grpSpPr>
-            <p:sp>
-              <p:nvSpPr>
-                <p:cNvPr id="42" name="Oval 41">
-                  <a:extLst>
-                    <a:ext uri="{FF2B5EF4-FFF2-40B4-BE49-F238E27FC236}">
-                      <a16:creationId xmlns:a16="http://schemas.microsoft.com/office/drawing/2014/main" id="{99F54A6D-44A7-914F-B89E-EC4772AAC3FA}"/>
-                    </a:ext>
-                  </a:extLst>
-                </p:cNvPr>
-                <p:cNvSpPr>
-                  <a:spLocks noChangeAspect="1"/>
-                </p:cNvSpPr>
-                <p:nvPr/>
-              </p:nvSpPr>
-              <p:spPr>
-                <a:xfrm>
-                  <a:off x="1653089" y="16830524"/>
-                  <a:ext cx="731519" cy="731519"/>
-                </a:xfrm>
-                <a:prstGeom prst="ellipse">
-                  <a:avLst/>
-                </a:prstGeom>
-                <a:solidFill>
-                  <a:srgbClr val="009E73"/>
-                </a:solidFill>
-                <a:ln>
-                  <a:solidFill>
-                    <a:schemeClr val="tx1"/>
-                  </a:solidFill>
-                </a:ln>
-              </p:spPr>
-              <p:style>
-                <a:lnRef idx="2">
-                  <a:schemeClr val="accent1">
-                    <a:shade val="50000"/>
-                  </a:schemeClr>
-                </a:lnRef>
-                <a:fillRef idx="1">
-                  <a:schemeClr val="accent1"/>
-                </a:fillRef>
-                <a:effectRef idx="0">
-                  <a:schemeClr val="accent1"/>
-                </a:effectRef>
-                <a:fontRef idx="minor">
-                  <a:schemeClr val="lt1"/>
-                </a:fontRef>
-              </p:style>
-              <p:txBody>
-                <a:bodyPr rtlCol="0" anchor="ctr"/>
-                <a:lstStyle/>
-                <a:p>
-                  <a:pPr algn="ctr"/>
-                  <a:endParaRPr lang="en-US" sz="9783" dirty="0"/>
-                </a:p>
-              </p:txBody>
-            </p:sp>
-            <p:cxnSp>
-              <p:nvCxnSpPr>
-                <p:cNvPr id="43" name="Straight Arrow Connector 42">
-                  <a:extLst>
-                    <a:ext uri="{FF2B5EF4-FFF2-40B4-BE49-F238E27FC236}">
-                      <a16:creationId xmlns:a16="http://schemas.microsoft.com/office/drawing/2014/main" id="{762CD341-AD56-AD45-9FE5-5FD0A7BAC1EA}"/>
-                    </a:ext>
-                  </a:extLst>
-                </p:cNvPr>
-                <p:cNvCxnSpPr>
-                  <a:cxnSpLocks/>
-                </p:cNvCxnSpPr>
-                <p:nvPr/>
-              </p:nvCxnSpPr>
-              <p:spPr>
-                <a:xfrm flipV="1">
-                  <a:off x="403026" y="17188483"/>
-                  <a:ext cx="1250063" cy="15600"/>
-                </a:xfrm>
-                <a:prstGeom prst="straightConnector1">
-                  <a:avLst/>
-                </a:prstGeom>
-                <a:ln w="57150">
-                  <a:solidFill>
-                    <a:schemeClr val="tx1"/>
-                  </a:solidFill>
-                  <a:headEnd type="none" w="med" len="med"/>
-                  <a:tailEnd type="arrow" w="med" len="med"/>
-                </a:ln>
-              </p:spPr>
-              <p:style>
-                <a:lnRef idx="1">
-                  <a:schemeClr val="accent1"/>
-                </a:lnRef>
-                <a:fillRef idx="0">
-                  <a:schemeClr val="accent1"/>
-                </a:fillRef>
-                <a:effectRef idx="0">
-                  <a:schemeClr val="accent1"/>
-                </a:effectRef>
-                <a:fontRef idx="minor">
-                  <a:schemeClr val="tx1"/>
-                </a:fontRef>
-              </p:style>
-            </p:cxnSp>
-          </p:grpSp>
-        </p:grpSp>
-        <p:grpSp>
-          <p:nvGrpSpPr>
-            <p:cNvPr id="29" name="Group 28">
-              <a:extLst>
-                <a:ext uri="{FF2B5EF4-FFF2-40B4-BE49-F238E27FC236}">
-                  <a16:creationId xmlns:a16="http://schemas.microsoft.com/office/drawing/2014/main" id="{D0C38E64-63CA-0A4E-987D-5B6002C73259}"/>
-                </a:ext>
-              </a:extLst>
-            </p:cNvPr>
-            <p:cNvGrpSpPr/>
-            <p:nvPr/>
-          </p:nvGrpSpPr>
-          <p:grpSpPr>
-            <a:xfrm>
-              <a:off x="403026" y="16944506"/>
-              <a:ext cx="6871784" cy="1323439"/>
-              <a:chOff x="403026" y="17522525"/>
-              <a:chExt cx="6871784" cy="1323439"/>
-            </a:xfrm>
-          </p:grpSpPr>
-          <p:sp>
-            <p:nvSpPr>
-              <p:cNvPr id="36" name="TextBox 35">
-                <a:extLst>
-                  <a:ext uri="{FF2B5EF4-FFF2-40B4-BE49-F238E27FC236}">
-                    <a16:creationId xmlns:a16="http://schemas.microsoft.com/office/drawing/2014/main" id="{39A2199B-841F-5D40-B0E8-6B6ED94C9391}"/>
-                  </a:ext>
-                </a:extLst>
-              </p:cNvPr>
-              <p:cNvSpPr txBox="1"/>
-              <p:nvPr/>
-            </p:nvSpPr>
-            <p:spPr>
-              <a:xfrm>
-                <a:off x="2955358" y="17522525"/>
-                <a:ext cx="4319452" cy="1323439"/>
-              </a:xfrm>
-              <a:prstGeom prst="rect">
-                <a:avLst/>
-              </a:prstGeom>
-              <a:noFill/>
-            </p:spPr>
-            <p:txBody>
-              <a:bodyPr wrap="none" rtlCol="0">
-                <a:spAutoFit/>
-              </a:bodyPr>
-              <a:lstStyle/>
-              <a:p>
-                <a:r>
-                  <a:rPr lang="en-US" sz="4000" dirty="0"/>
-                  <a:t>Somewhat intrusive</a:t>
-                </a:r>
-              </a:p>
-              <a:p>
-                <a:r>
-                  <a:rPr lang="en-US" sz="4000" dirty="0"/>
-                  <a:t>(penalty = 1)</a:t>
-                </a:r>
-              </a:p>
-            </p:txBody>
-          </p:sp>
-          <p:grpSp>
-            <p:nvGrpSpPr>
-              <p:cNvPr id="37" name="Group 36">
-                <a:extLst>
-                  <a:ext uri="{FF2B5EF4-FFF2-40B4-BE49-F238E27FC236}">
-                    <a16:creationId xmlns:a16="http://schemas.microsoft.com/office/drawing/2014/main" id="{6E2475EA-A0C9-B743-B257-D9E05757EA52}"/>
-                  </a:ext>
-                </a:extLst>
-              </p:cNvPr>
-              <p:cNvGrpSpPr/>
-              <p:nvPr/>
-            </p:nvGrpSpPr>
-            <p:grpSpPr>
-              <a:xfrm>
-                <a:off x="403026" y="17849440"/>
-                <a:ext cx="1981582" cy="731519"/>
-                <a:chOff x="403026" y="18390763"/>
-                <a:chExt cx="1981582" cy="731519"/>
-              </a:xfrm>
-            </p:grpSpPr>
-            <p:sp>
-              <p:nvSpPr>
-                <p:cNvPr id="38" name="Oval 37">
-                  <a:extLst>
-                    <a:ext uri="{FF2B5EF4-FFF2-40B4-BE49-F238E27FC236}">
-                      <a16:creationId xmlns:a16="http://schemas.microsoft.com/office/drawing/2014/main" id="{B638003D-58D1-4141-8420-B4CD1CC6E25A}"/>
-                    </a:ext>
-                  </a:extLst>
-                </p:cNvPr>
-                <p:cNvSpPr>
-                  <a:spLocks noChangeAspect="1"/>
-                </p:cNvSpPr>
-                <p:nvPr/>
-              </p:nvSpPr>
-              <p:spPr>
-                <a:xfrm>
-                  <a:off x="1653089" y="18390763"/>
-                  <a:ext cx="731519" cy="731519"/>
-                </a:xfrm>
-                <a:prstGeom prst="ellipse">
-                  <a:avLst/>
-                </a:prstGeom>
-                <a:solidFill>
-                  <a:srgbClr val="F0E442"/>
-                </a:solidFill>
-                <a:ln>
-                  <a:solidFill>
-                    <a:schemeClr val="tx1"/>
-                  </a:solidFill>
-                </a:ln>
-              </p:spPr>
-              <p:style>
-                <a:lnRef idx="2">
-                  <a:schemeClr val="accent1">
-                    <a:shade val="50000"/>
-                  </a:schemeClr>
-                </a:lnRef>
-                <a:fillRef idx="1">
-                  <a:schemeClr val="accent1"/>
-                </a:fillRef>
-                <a:effectRef idx="0">
-                  <a:schemeClr val="accent1"/>
-                </a:effectRef>
-                <a:fontRef idx="minor">
-                  <a:schemeClr val="lt1"/>
-                </a:fontRef>
-              </p:style>
-              <p:txBody>
-                <a:bodyPr rtlCol="0" anchor="ctr"/>
-                <a:lstStyle/>
-                <a:p>
-                  <a:pPr algn="ctr"/>
-                  <a:endParaRPr lang="en-US" sz="9783"/>
-                </a:p>
-              </p:txBody>
-            </p:sp>
-            <p:cxnSp>
-              <p:nvCxnSpPr>
-                <p:cNvPr id="39" name="Straight Arrow Connector 38">
-                  <a:extLst>
-                    <a:ext uri="{FF2B5EF4-FFF2-40B4-BE49-F238E27FC236}">
-                      <a16:creationId xmlns:a16="http://schemas.microsoft.com/office/drawing/2014/main" id="{B960F67E-FD31-4D4F-B5BE-86B46DF86B25}"/>
-                    </a:ext>
-                  </a:extLst>
-                </p:cNvPr>
-                <p:cNvCxnSpPr>
-                  <a:cxnSpLocks/>
-                </p:cNvCxnSpPr>
-                <p:nvPr/>
-              </p:nvCxnSpPr>
-              <p:spPr>
-                <a:xfrm>
-                  <a:off x="403026" y="18756522"/>
-                  <a:ext cx="1250063" cy="0"/>
-                </a:xfrm>
-                <a:prstGeom prst="straightConnector1">
-                  <a:avLst/>
-                </a:prstGeom>
-                <a:ln w="57150">
-                  <a:solidFill>
-                    <a:schemeClr val="tx1"/>
-                  </a:solidFill>
-                  <a:headEnd type="none" w="med" len="med"/>
-                  <a:tailEnd type="arrow" w="med" len="med"/>
-                </a:ln>
-              </p:spPr>
-              <p:style>
-                <a:lnRef idx="1">
-                  <a:schemeClr val="accent1"/>
-                </a:lnRef>
-                <a:fillRef idx="0">
-                  <a:schemeClr val="accent1"/>
-                </a:fillRef>
-                <a:effectRef idx="0">
-                  <a:schemeClr val="accent1"/>
-                </a:effectRef>
-                <a:fontRef idx="minor">
-                  <a:schemeClr val="tx1"/>
-                </a:fontRef>
-              </p:style>
-            </p:cxnSp>
-          </p:grpSp>
-        </p:grpSp>
-        <p:grpSp>
-          <p:nvGrpSpPr>
-            <p:cNvPr id="30" name="Group 29">
-              <a:extLst>
-                <a:ext uri="{FF2B5EF4-FFF2-40B4-BE49-F238E27FC236}">
-                  <a16:creationId xmlns:a16="http://schemas.microsoft.com/office/drawing/2014/main" id="{04CA9435-797F-AB41-9673-3C43812F80B4}"/>
-                </a:ext>
-              </a:extLst>
-            </p:cNvPr>
-            <p:cNvGrpSpPr/>
-            <p:nvPr/>
-          </p:nvGrpSpPr>
-          <p:grpSpPr>
-            <a:xfrm>
-              <a:off x="403026" y="18853237"/>
-              <a:ext cx="5526367" cy="1323439"/>
-              <a:chOff x="403026" y="19305508"/>
-              <a:chExt cx="5526367" cy="1323439"/>
-            </a:xfrm>
-          </p:grpSpPr>
-          <p:sp>
-            <p:nvSpPr>
-              <p:cNvPr id="32" name="TextBox 31">
-                <a:extLst>
-                  <a:ext uri="{FF2B5EF4-FFF2-40B4-BE49-F238E27FC236}">
-                    <a16:creationId xmlns:a16="http://schemas.microsoft.com/office/drawing/2014/main" id="{D71CD979-16FE-C64F-8C1F-595F8154B15B}"/>
-                  </a:ext>
-                </a:extLst>
-              </p:cNvPr>
-              <p:cNvSpPr txBox="1"/>
-              <p:nvPr/>
-            </p:nvSpPr>
-            <p:spPr>
-              <a:xfrm>
-                <a:off x="2892087" y="19305508"/>
-                <a:ext cx="3037306" cy="1323439"/>
-              </a:xfrm>
-              <a:prstGeom prst="rect">
-                <a:avLst/>
-              </a:prstGeom>
-              <a:noFill/>
-            </p:spPr>
-            <p:txBody>
-              <a:bodyPr wrap="none" rtlCol="0">
-                <a:spAutoFit/>
-              </a:bodyPr>
-              <a:lstStyle/>
-              <a:p>
-                <a:r>
-                  <a:rPr lang="en-US" sz="4000" dirty="0"/>
-                  <a:t>Very intrusive</a:t>
-                </a:r>
-              </a:p>
-              <a:p>
-                <a:r>
-                  <a:rPr lang="en-US" sz="4000" dirty="0"/>
-                  <a:t>(penalty = 3)</a:t>
-                </a:r>
-              </a:p>
-            </p:txBody>
-          </p:sp>
-          <p:grpSp>
-            <p:nvGrpSpPr>
-              <p:cNvPr id="33" name="Group 32">
-                <a:extLst>
-                  <a:ext uri="{FF2B5EF4-FFF2-40B4-BE49-F238E27FC236}">
-                    <a16:creationId xmlns:a16="http://schemas.microsoft.com/office/drawing/2014/main" id="{5A48807C-7282-B34C-9410-2CDEC3641DAC}"/>
-                  </a:ext>
-                </a:extLst>
-              </p:cNvPr>
-              <p:cNvGrpSpPr/>
-              <p:nvPr/>
-            </p:nvGrpSpPr>
-            <p:grpSpPr>
-              <a:xfrm>
-                <a:off x="403026" y="19601469"/>
-                <a:ext cx="1981582" cy="731519"/>
-                <a:chOff x="403026" y="19951002"/>
-                <a:chExt cx="1981582" cy="731519"/>
-              </a:xfrm>
-            </p:grpSpPr>
-            <p:sp>
-              <p:nvSpPr>
-                <p:cNvPr id="34" name="Oval 33">
-                  <a:extLst>
-                    <a:ext uri="{FF2B5EF4-FFF2-40B4-BE49-F238E27FC236}">
-                      <a16:creationId xmlns:a16="http://schemas.microsoft.com/office/drawing/2014/main" id="{2DB80235-459C-8745-AC8E-C05BE30D5E3B}"/>
-                    </a:ext>
-                  </a:extLst>
-                </p:cNvPr>
-                <p:cNvSpPr>
-                  <a:spLocks noChangeAspect="1"/>
-                </p:cNvSpPr>
-                <p:nvPr/>
-              </p:nvSpPr>
-              <p:spPr>
-                <a:xfrm>
-                  <a:off x="1653089" y="19951002"/>
-                  <a:ext cx="731519" cy="731519"/>
-                </a:xfrm>
-                <a:prstGeom prst="ellipse">
-                  <a:avLst/>
-                </a:prstGeom>
-                <a:solidFill>
-                  <a:srgbClr val="D55E00"/>
-                </a:solidFill>
-                <a:ln>
-                  <a:solidFill>
-                    <a:schemeClr val="tx1"/>
-                  </a:solidFill>
-                </a:ln>
-              </p:spPr>
-              <p:style>
-                <a:lnRef idx="2">
-                  <a:schemeClr val="accent1">
-                    <a:shade val="50000"/>
-                  </a:schemeClr>
-                </a:lnRef>
-                <a:fillRef idx="1">
-                  <a:schemeClr val="accent1"/>
-                </a:fillRef>
-                <a:effectRef idx="0">
-                  <a:schemeClr val="accent1"/>
-                </a:effectRef>
-                <a:fontRef idx="minor">
-                  <a:schemeClr val="lt1"/>
-                </a:fontRef>
-              </p:style>
-              <p:txBody>
-                <a:bodyPr rtlCol="0" anchor="ctr"/>
-                <a:lstStyle/>
-                <a:p>
-                  <a:pPr algn="ctr"/>
-                  <a:endParaRPr lang="en-US" sz="9783"/>
-                </a:p>
-              </p:txBody>
-            </p:sp>
-            <p:cxnSp>
-              <p:nvCxnSpPr>
-                <p:cNvPr id="35" name="Straight Arrow Connector 34">
-                  <a:extLst>
-                    <a:ext uri="{FF2B5EF4-FFF2-40B4-BE49-F238E27FC236}">
-                      <a16:creationId xmlns:a16="http://schemas.microsoft.com/office/drawing/2014/main" id="{9EB6EB0E-1015-B04E-B4A5-9282A386CF4C}"/>
-                    </a:ext>
-                  </a:extLst>
-                </p:cNvPr>
-                <p:cNvCxnSpPr>
-                  <a:cxnSpLocks/>
-                </p:cNvCxnSpPr>
-                <p:nvPr/>
-              </p:nvCxnSpPr>
-              <p:spPr>
-                <a:xfrm>
-                  <a:off x="403026" y="20316761"/>
-                  <a:ext cx="1250063" cy="0"/>
-                </a:xfrm>
-                <a:prstGeom prst="straightConnector1">
-                  <a:avLst/>
-                </a:prstGeom>
-                <a:ln w="57150">
-                  <a:solidFill>
-                    <a:schemeClr val="tx1"/>
-                  </a:solidFill>
-                  <a:headEnd type="none" w="med" len="med"/>
-                  <a:tailEnd type="arrow" w="med" len="med"/>
-                </a:ln>
-              </p:spPr>
-              <p:style>
-                <a:lnRef idx="1">
-                  <a:schemeClr val="accent1"/>
-                </a:lnRef>
-                <a:fillRef idx="0">
-                  <a:schemeClr val="accent1"/>
-                </a:fillRef>
-                <a:effectRef idx="0">
-                  <a:schemeClr val="accent1"/>
-                </a:effectRef>
-                <a:fontRef idx="minor">
-                  <a:schemeClr val="tx1"/>
-                </a:fontRef>
-              </p:style>
-            </p:cxnSp>
-          </p:grpSp>
-        </p:grpSp>
-        <p:sp>
-          <p:nvSpPr>
-            <p:cNvPr id="31" name="TextBox 30">
-              <a:extLst>
-                <a:ext uri="{FF2B5EF4-FFF2-40B4-BE49-F238E27FC236}">
-                  <a16:creationId xmlns:a16="http://schemas.microsoft.com/office/drawing/2014/main" id="{9EA0350D-4615-C147-97A2-6A450BC54015}"/>
+                  <a16:creationId xmlns:a16="http://schemas.microsoft.com/office/drawing/2014/main" id="{6CDE2851-9997-6F49-B5AA-5438782D41A9}"/>
                 </a:ext>
               </a:extLst>
             </p:cNvPr>
@@ -4975,8 +4145,8 @@
           </p:nvSpPr>
           <p:spPr>
             <a:xfrm>
-              <a:off x="403017" y="13994695"/>
-              <a:ext cx="3135410" cy="738664"/>
+              <a:off x="3049408" y="15801450"/>
+              <a:ext cx="3015441" cy="1323439"/>
             </a:xfrm>
             <a:prstGeom prst="rect">
               <a:avLst/>
@@ -4990,13 +4160,176 @@
             <a:lstStyle/>
             <a:p>
               <a:r>
-                <a:rPr lang="en-US" sz="4200" b="1" dirty="0"/>
-                <a:t>Intrusiveness</a:t>
+                <a:rPr lang="en-US" sz="4000" dirty="0"/>
+                <a:t>Non-intrusive</a:t>
+              </a:r>
+            </a:p>
+            <a:p>
+              <a:r>
+                <a:rPr lang="en-US" sz="4000" dirty="0"/>
+                <a:t>(penalty = 0)</a:t>
               </a:r>
             </a:p>
           </p:txBody>
         </p:sp>
+        <p:grpSp>
+          <p:nvGrpSpPr>
+            <p:cNvPr id="41" name="Group 40">
+              <a:extLst>
+                <a:ext uri="{FF2B5EF4-FFF2-40B4-BE49-F238E27FC236}">
+                  <a16:creationId xmlns:a16="http://schemas.microsoft.com/office/drawing/2014/main" id="{A4A081D4-12E2-D54F-BBC6-8DFFF42DE7C7}"/>
+                </a:ext>
+              </a:extLst>
+            </p:cNvPr>
+            <p:cNvGrpSpPr/>
+            <p:nvPr/>
+          </p:nvGrpSpPr>
+          <p:grpSpPr>
+            <a:xfrm>
+              <a:off x="403026" y="16097410"/>
+              <a:ext cx="1981582" cy="731519"/>
+              <a:chOff x="403026" y="16830524"/>
+              <a:chExt cx="1981582" cy="731519"/>
+            </a:xfrm>
+          </p:grpSpPr>
+          <p:sp>
+            <p:nvSpPr>
+              <p:cNvPr id="42" name="Oval 41">
+                <a:extLst>
+                  <a:ext uri="{FF2B5EF4-FFF2-40B4-BE49-F238E27FC236}">
+                    <a16:creationId xmlns:a16="http://schemas.microsoft.com/office/drawing/2014/main" id="{99F54A6D-44A7-914F-B89E-EC4772AAC3FA}"/>
+                  </a:ext>
+                </a:extLst>
+              </p:cNvPr>
+              <p:cNvSpPr>
+                <a:spLocks noChangeAspect="1"/>
+              </p:cNvSpPr>
+              <p:nvPr/>
+            </p:nvSpPr>
+            <p:spPr>
+              <a:xfrm>
+                <a:off x="1653089" y="16830524"/>
+                <a:ext cx="731519" cy="731519"/>
+              </a:xfrm>
+              <a:prstGeom prst="ellipse">
+                <a:avLst/>
+              </a:prstGeom>
+              <a:solidFill>
+                <a:srgbClr val="00FF00"/>
+              </a:solidFill>
+              <a:ln w="19050">
+                <a:solidFill>
+                  <a:schemeClr val="tx1"/>
+                </a:solidFill>
+              </a:ln>
+            </p:spPr>
+            <p:style>
+              <a:lnRef idx="2">
+                <a:schemeClr val="accent1">
+                  <a:shade val="50000"/>
+                </a:schemeClr>
+              </a:lnRef>
+              <a:fillRef idx="1">
+                <a:schemeClr val="accent1"/>
+              </a:fillRef>
+              <a:effectRef idx="0">
+                <a:schemeClr val="accent1"/>
+              </a:effectRef>
+              <a:fontRef idx="minor">
+                <a:schemeClr val="lt1"/>
+              </a:fontRef>
+            </p:style>
+            <p:txBody>
+              <a:bodyPr rtlCol="0" anchor="ctr"/>
+              <a:lstStyle/>
+              <a:p>
+                <a:pPr algn="ctr"/>
+                <a:endParaRPr lang="en-US" sz="9783" dirty="0"/>
+              </a:p>
+            </p:txBody>
+          </p:sp>
+          <p:cxnSp>
+            <p:nvCxnSpPr>
+              <p:cNvPr id="43" name="Straight Arrow Connector 42">
+                <a:extLst>
+                  <a:ext uri="{FF2B5EF4-FFF2-40B4-BE49-F238E27FC236}">
+                    <a16:creationId xmlns:a16="http://schemas.microsoft.com/office/drawing/2014/main" id="{762CD341-AD56-AD45-9FE5-5FD0A7BAC1EA}"/>
+                  </a:ext>
+                </a:extLst>
+              </p:cNvPr>
+              <p:cNvCxnSpPr>
+                <a:cxnSpLocks/>
+              </p:cNvCxnSpPr>
+              <p:nvPr/>
+            </p:nvCxnSpPr>
+            <p:spPr>
+              <a:xfrm flipV="1">
+                <a:off x="403026" y="17188483"/>
+                <a:ext cx="1250063" cy="15600"/>
+              </a:xfrm>
+              <a:prstGeom prst="straightConnector1">
+                <a:avLst/>
+              </a:prstGeom>
+              <a:ln w="57150">
+                <a:solidFill>
+                  <a:schemeClr val="tx1"/>
+                </a:solidFill>
+                <a:headEnd type="none" w="med" len="med"/>
+                <a:tailEnd type="arrow" w="med" len="med"/>
+              </a:ln>
+            </p:spPr>
+            <p:style>
+              <a:lnRef idx="1">
+                <a:schemeClr val="accent1"/>
+              </a:lnRef>
+              <a:fillRef idx="0">
+                <a:schemeClr val="accent1"/>
+              </a:fillRef>
+              <a:effectRef idx="0">
+                <a:schemeClr val="accent1"/>
+              </a:effectRef>
+              <a:fontRef idx="minor">
+                <a:schemeClr val="tx1"/>
+              </a:fontRef>
+            </p:style>
+          </p:cxnSp>
+        </p:grpSp>
       </p:grpSp>
+      <p:sp>
+        <p:nvSpPr>
+          <p:cNvPr id="31" name="TextBox 30">
+            <a:extLst>
+              <a:ext uri="{FF2B5EF4-FFF2-40B4-BE49-F238E27FC236}">
+                <a16:creationId xmlns:a16="http://schemas.microsoft.com/office/drawing/2014/main" id="{9EA0350D-4615-C147-97A2-6A450BC54015}"/>
+              </a:ext>
+            </a:extLst>
+          </p:cNvPr>
+          <p:cNvSpPr txBox="1"/>
+          <p:nvPr/>
+        </p:nvSpPr>
+        <p:spPr>
+          <a:xfrm>
+            <a:off x="403017" y="13994695"/>
+            <a:ext cx="3135410" cy="738664"/>
+          </a:xfrm>
+          <a:prstGeom prst="rect">
+            <a:avLst/>
+          </a:prstGeom>
+          <a:noFill/>
+        </p:spPr>
+        <p:txBody>
+          <a:bodyPr wrap="none" rtlCol="0">
+            <a:spAutoFit/>
+          </a:bodyPr>
+          <a:lstStyle/>
+          <a:p>
+            <a:r>
+              <a:rPr lang="en-US" sz="4200" b="1" dirty="0"/>
+              <a:t>Intrusiveness</a:t>
+            </a:r>
+          </a:p>
+        </p:txBody>
+      </p:sp>
       <p:sp>
         <p:nvSpPr>
           <p:cNvPr id="45" name="TextBox 44">
@@ -5109,13 +4442,13 @@
           <p:spPr>
             <a:xfrm>
               <a:off x="403017" y="12524110"/>
-              <a:ext cx="2240280" cy="182880"/>
+              <a:ext cx="2240280" cy="274320"/>
             </a:xfrm>
             <a:prstGeom prst="rect">
               <a:avLst/>
             </a:prstGeom>
             <a:solidFill>
-              <a:srgbClr val="56B4E9"/>
+              <a:srgbClr val="87CEEB"/>
             </a:solidFill>
             <a:ln>
               <a:noFill/>
@@ -5224,13 +4557,13 @@
           <p:spPr>
             <a:xfrm>
               <a:off x="403017" y="13798340"/>
-              <a:ext cx="2240280" cy="182880"/>
+              <a:ext cx="2240280" cy="274320"/>
             </a:xfrm>
             <a:prstGeom prst="rect">
               <a:avLst/>
             </a:prstGeom>
             <a:solidFill>
-              <a:srgbClr val="0072B2"/>
+              <a:srgbClr val="0000FF"/>
             </a:solidFill>
             <a:ln>
               <a:noFill/>
@@ -5394,9 +4727,9 @@
             <p:grpSpPr>
               <a:xfrm>
                 <a:off x="403017" y="22855622"/>
-                <a:ext cx="2240280" cy="862542"/>
+                <a:ext cx="2240280" cy="953982"/>
                 <a:chOff x="403017" y="22882158"/>
-                <a:chExt cx="2240280" cy="862542"/>
+                <a:chExt cx="2240280" cy="953982"/>
               </a:xfrm>
             </p:grpSpPr>
             <p:sp>
@@ -5449,13 +4782,13 @@
               <p:spPr>
                 <a:xfrm>
                   <a:off x="403017" y="23561820"/>
-                  <a:ext cx="2240280" cy="182880"/>
+                  <a:ext cx="2240280" cy="274320"/>
                 </a:xfrm>
                 <a:prstGeom prst="rect">
                   <a:avLst/>
                 </a:prstGeom>
                 <a:solidFill>
-                  <a:srgbClr val="56B4E9"/>
+                  <a:srgbClr val="87CEEB"/>
                 </a:solidFill>
                 <a:ln>
                   <a:noFill/>
@@ -5565,9 +4898,9 @@
             <p:grpSpPr>
               <a:xfrm>
                 <a:off x="390672" y="24523333"/>
-                <a:ext cx="2240280" cy="987499"/>
+                <a:ext cx="2240280" cy="1078939"/>
                 <a:chOff x="390672" y="24523333"/>
-                <a:chExt cx="2240280" cy="987499"/>
+                <a:chExt cx="2240280" cy="1078939"/>
               </a:xfrm>
             </p:grpSpPr>
             <p:sp>
@@ -5620,13 +4953,13 @@
               <p:spPr>
                 <a:xfrm>
                   <a:off x="390672" y="25327952"/>
-                  <a:ext cx="2240280" cy="182880"/>
+                  <a:ext cx="2240280" cy="274320"/>
                 </a:xfrm>
                 <a:prstGeom prst="rect">
                   <a:avLst/>
                 </a:prstGeom>
                 <a:solidFill>
-                  <a:srgbClr val="0072B2"/>
+                  <a:srgbClr val="0000FF"/>
                 </a:solidFill>
                 <a:ln>
                   <a:noFill/>
@@ -5736,9 +5069,9 @@
             <p:grpSpPr>
               <a:xfrm>
                 <a:off x="390672" y="26074891"/>
-                <a:ext cx="2240280" cy="987499"/>
+                <a:ext cx="2240280" cy="1078939"/>
                 <a:chOff x="390672" y="24523333"/>
-                <a:chExt cx="2240280" cy="987499"/>
+                <a:chExt cx="2240280" cy="1078939"/>
               </a:xfrm>
             </p:grpSpPr>
             <p:sp>
@@ -5791,13 +5124,13 @@
               <p:spPr>
                 <a:xfrm>
                   <a:off x="390672" y="25327952"/>
-                  <a:ext cx="2240280" cy="182880"/>
+                  <a:ext cx="2240280" cy="274320"/>
                 </a:xfrm>
                 <a:prstGeom prst="rect">
                   <a:avLst/>
                 </a:prstGeom>
                 <a:solidFill>
-                  <a:srgbClr val="0072B2"/>
+                  <a:srgbClr val="0000FF"/>
                 </a:solidFill>
                 <a:ln>
                   <a:noFill/>
@@ -6077,6 +5410,598 @@
               </a:fontRef>
             </p:style>
           </p:cxnSp>
+        </p:grpSp>
+      </p:grpSp>
+      <p:grpSp>
+        <p:nvGrpSpPr>
+          <p:cNvPr id="44" name="Group 43">
+            <a:extLst>
+              <a:ext uri="{FF2B5EF4-FFF2-40B4-BE49-F238E27FC236}">
+                <a16:creationId xmlns:a16="http://schemas.microsoft.com/office/drawing/2014/main" id="{50DA0E99-6250-5A42-820B-5D5AB967724D}"/>
+              </a:ext>
+            </a:extLst>
+          </p:cNvPr>
+          <p:cNvGrpSpPr/>
+          <p:nvPr/>
+        </p:nvGrpSpPr>
+        <p:grpSpPr>
+          <a:xfrm>
+            <a:off x="661414" y="2128175"/>
+            <a:ext cx="4989031" cy="731520"/>
+            <a:chOff x="661414" y="2128175"/>
+            <a:chExt cx="4989031" cy="731520"/>
+          </a:xfrm>
+        </p:grpSpPr>
+        <p:sp>
+          <p:nvSpPr>
+            <p:cNvPr id="10" name="TextBox 9">
+              <a:extLst>
+                <a:ext uri="{FF2B5EF4-FFF2-40B4-BE49-F238E27FC236}">
+                  <a16:creationId xmlns:a16="http://schemas.microsoft.com/office/drawing/2014/main" id="{92107F56-CB54-F649-9DDF-D5B892E337C2}"/>
+                </a:ext>
+              </a:extLst>
+            </p:cNvPr>
+            <p:cNvSpPr txBox="1"/>
+            <p:nvPr/>
+          </p:nvSpPr>
+          <p:spPr>
+            <a:xfrm>
+              <a:off x="1758482" y="2151809"/>
+              <a:ext cx="3891963" cy="707886"/>
+            </a:xfrm>
+            <a:prstGeom prst="rect">
+              <a:avLst/>
+            </a:prstGeom>
+            <a:noFill/>
+          </p:spPr>
+          <p:txBody>
+            <a:bodyPr wrap="none" rtlCol="0">
+              <a:spAutoFit/>
+            </a:bodyPr>
+            <a:lstStyle/>
+            <a:p>
+              <a:r>
+                <a:rPr lang="en-US" sz="4000" dirty="0"/>
+                <a:t>Semi-Private Area</a:t>
+              </a:r>
+            </a:p>
+          </p:txBody>
+        </p:sp>
+        <p:sp>
+          <p:nvSpPr>
+            <p:cNvPr id="16" name="Rectangle 15">
+              <a:extLst>
+                <a:ext uri="{FF2B5EF4-FFF2-40B4-BE49-F238E27FC236}">
+                  <a16:creationId xmlns:a16="http://schemas.microsoft.com/office/drawing/2014/main" id="{22493ACB-BF27-554A-AD47-FF984C5582E8}"/>
+                </a:ext>
+              </a:extLst>
+            </p:cNvPr>
+            <p:cNvSpPr>
+              <a:spLocks noChangeAspect="1"/>
+            </p:cNvSpPr>
+            <p:nvPr/>
+          </p:nvSpPr>
+          <p:spPr>
+            <a:xfrm>
+              <a:off x="661414" y="2128175"/>
+              <a:ext cx="731520" cy="731520"/>
+            </a:xfrm>
+            <a:prstGeom prst="rect">
+              <a:avLst/>
+            </a:prstGeom>
+            <a:solidFill>
+              <a:srgbClr val="FFFF00"/>
+            </a:solidFill>
+            <a:ln w="19050">
+              <a:solidFill>
+                <a:schemeClr val="tx1"/>
+              </a:solidFill>
+            </a:ln>
+          </p:spPr>
+          <p:style>
+            <a:lnRef idx="2">
+              <a:schemeClr val="accent1">
+                <a:shade val="50000"/>
+              </a:schemeClr>
+            </a:lnRef>
+            <a:fillRef idx="1">
+              <a:schemeClr val="accent1"/>
+            </a:fillRef>
+            <a:effectRef idx="0">
+              <a:schemeClr val="accent1"/>
+            </a:effectRef>
+            <a:fontRef idx="minor">
+              <a:schemeClr val="lt1"/>
+            </a:fontRef>
+          </p:style>
+          <p:txBody>
+            <a:bodyPr rtlCol="0" anchor="ctr"/>
+            <a:lstStyle/>
+            <a:p>
+              <a:pPr algn="ctr"/>
+              <a:endParaRPr lang="en-US"/>
+            </a:p>
+          </p:txBody>
+        </p:sp>
+      </p:grpSp>
+      <p:grpSp>
+        <p:nvGrpSpPr>
+          <p:cNvPr id="52" name="Group 51">
+            <a:extLst>
+              <a:ext uri="{FF2B5EF4-FFF2-40B4-BE49-F238E27FC236}">
+                <a16:creationId xmlns:a16="http://schemas.microsoft.com/office/drawing/2014/main" id="{4EB1E34B-55E0-F849-BDDE-CBD1CF2E398A}"/>
+              </a:ext>
+            </a:extLst>
+          </p:cNvPr>
+          <p:cNvGrpSpPr/>
+          <p:nvPr/>
+        </p:nvGrpSpPr>
+        <p:grpSpPr>
+          <a:xfrm>
+            <a:off x="643126" y="3187596"/>
+            <a:ext cx="3832318" cy="757425"/>
+            <a:chOff x="643126" y="3187596"/>
+            <a:chExt cx="3832318" cy="757425"/>
+          </a:xfrm>
+        </p:grpSpPr>
+        <p:sp>
+          <p:nvSpPr>
+            <p:cNvPr id="8" name="TextBox 7">
+              <a:extLst>
+                <a:ext uri="{FF2B5EF4-FFF2-40B4-BE49-F238E27FC236}">
+                  <a16:creationId xmlns:a16="http://schemas.microsoft.com/office/drawing/2014/main" id="{C1461940-5499-EF41-80BF-C686DD88264C}"/>
+                </a:ext>
+              </a:extLst>
+            </p:cNvPr>
+            <p:cNvSpPr txBox="1"/>
+            <p:nvPr/>
+          </p:nvSpPr>
+          <p:spPr>
+            <a:xfrm>
+              <a:off x="1758482" y="3237135"/>
+              <a:ext cx="2716962" cy="707886"/>
+            </a:xfrm>
+            <a:prstGeom prst="rect">
+              <a:avLst/>
+            </a:prstGeom>
+            <a:noFill/>
+          </p:spPr>
+          <p:txBody>
+            <a:bodyPr wrap="none" rtlCol="0">
+              <a:spAutoFit/>
+            </a:bodyPr>
+            <a:lstStyle/>
+            <a:p>
+              <a:r>
+                <a:rPr lang="en-US" sz="4000" dirty="0"/>
+                <a:t>Private Area</a:t>
+              </a:r>
+            </a:p>
+          </p:txBody>
+        </p:sp>
+        <p:sp>
+          <p:nvSpPr>
+            <p:cNvPr id="27" name="Regular Pentagon 26">
+              <a:extLst>
+                <a:ext uri="{FF2B5EF4-FFF2-40B4-BE49-F238E27FC236}">
+                  <a16:creationId xmlns:a16="http://schemas.microsoft.com/office/drawing/2014/main" id="{0D674586-6C6B-DC4E-9630-DA2FF789A74E}"/>
+                </a:ext>
+              </a:extLst>
+            </p:cNvPr>
+            <p:cNvSpPr>
+              <a:spLocks noChangeAspect="1"/>
+            </p:cNvSpPr>
+            <p:nvPr/>
+          </p:nvSpPr>
+          <p:spPr>
+            <a:xfrm>
+              <a:off x="643126" y="3187596"/>
+              <a:ext cx="768096" cy="731520"/>
+            </a:xfrm>
+            <a:prstGeom prst="pentagon">
+              <a:avLst/>
+            </a:prstGeom>
+            <a:solidFill>
+              <a:srgbClr val="FF0000"/>
+            </a:solidFill>
+            <a:ln w="19050">
+              <a:solidFill>
+                <a:schemeClr val="tx1"/>
+              </a:solidFill>
+            </a:ln>
+          </p:spPr>
+          <p:style>
+            <a:lnRef idx="2">
+              <a:schemeClr val="accent1">
+                <a:shade val="50000"/>
+              </a:schemeClr>
+            </a:lnRef>
+            <a:fillRef idx="1">
+              <a:schemeClr val="accent1"/>
+            </a:fillRef>
+            <a:effectRef idx="0">
+              <a:schemeClr val="accent1"/>
+            </a:effectRef>
+            <a:fontRef idx="minor">
+              <a:schemeClr val="lt1"/>
+            </a:fontRef>
+          </p:style>
+          <p:txBody>
+            <a:bodyPr rtlCol="0" anchor="ctr"/>
+            <a:lstStyle/>
+            <a:p>
+              <a:pPr algn="ctr"/>
+              <a:endParaRPr lang="en-US"/>
+            </a:p>
+          </p:txBody>
+        </p:sp>
+      </p:grpSp>
+      <p:grpSp>
+        <p:nvGrpSpPr>
+          <p:cNvPr id="83" name="Group 82">
+            <a:extLst>
+              <a:ext uri="{FF2B5EF4-FFF2-40B4-BE49-F238E27FC236}">
+                <a16:creationId xmlns:a16="http://schemas.microsoft.com/office/drawing/2014/main" id="{E4CA6C37-DE16-FE42-984E-5BEF588B3135}"/>
+              </a:ext>
+            </a:extLst>
+          </p:cNvPr>
+          <p:cNvGrpSpPr/>
+          <p:nvPr/>
+        </p:nvGrpSpPr>
+        <p:grpSpPr>
+          <a:xfrm>
+            <a:off x="403026" y="16944506"/>
+            <a:ext cx="6871784" cy="1323439"/>
+            <a:chOff x="403026" y="16944506"/>
+            <a:chExt cx="6871784" cy="1323439"/>
+          </a:xfrm>
+        </p:grpSpPr>
+        <p:sp>
+          <p:nvSpPr>
+            <p:cNvPr id="36" name="TextBox 35">
+              <a:extLst>
+                <a:ext uri="{FF2B5EF4-FFF2-40B4-BE49-F238E27FC236}">
+                  <a16:creationId xmlns:a16="http://schemas.microsoft.com/office/drawing/2014/main" id="{39A2199B-841F-5D40-B0E8-6B6ED94C9391}"/>
+                </a:ext>
+              </a:extLst>
+            </p:cNvPr>
+            <p:cNvSpPr txBox="1"/>
+            <p:nvPr/>
+          </p:nvSpPr>
+          <p:spPr>
+            <a:xfrm>
+              <a:off x="2955358" y="16944506"/>
+              <a:ext cx="4319452" cy="1323439"/>
+            </a:xfrm>
+            <a:prstGeom prst="rect">
+              <a:avLst/>
+            </a:prstGeom>
+            <a:noFill/>
+          </p:spPr>
+          <p:txBody>
+            <a:bodyPr wrap="none" rtlCol="0">
+              <a:spAutoFit/>
+            </a:bodyPr>
+            <a:lstStyle/>
+            <a:p>
+              <a:r>
+                <a:rPr lang="en-US" sz="4000" dirty="0"/>
+                <a:t>Somewhat intrusive</a:t>
+              </a:r>
+            </a:p>
+            <a:p>
+              <a:r>
+                <a:rPr lang="en-US" sz="4000" dirty="0"/>
+                <a:t>(penalty = 1)</a:t>
+              </a:r>
+            </a:p>
+          </p:txBody>
+        </p:sp>
+        <p:grpSp>
+          <p:nvGrpSpPr>
+            <p:cNvPr id="77" name="Group 76">
+              <a:extLst>
+                <a:ext uri="{FF2B5EF4-FFF2-40B4-BE49-F238E27FC236}">
+                  <a16:creationId xmlns:a16="http://schemas.microsoft.com/office/drawing/2014/main" id="{FDB2FCD6-A504-2743-B7AA-127B456408A3}"/>
+                </a:ext>
+              </a:extLst>
+            </p:cNvPr>
+            <p:cNvGrpSpPr/>
+            <p:nvPr/>
+          </p:nvGrpSpPr>
+          <p:grpSpPr>
+            <a:xfrm>
+              <a:off x="403026" y="17267331"/>
+              <a:ext cx="1975447" cy="731520"/>
+              <a:chOff x="403026" y="17267331"/>
+              <a:chExt cx="1975447" cy="731520"/>
+            </a:xfrm>
+          </p:grpSpPr>
+          <p:cxnSp>
+            <p:nvCxnSpPr>
+              <p:cNvPr id="39" name="Straight Arrow Connector 38">
+                <a:extLst>
+                  <a:ext uri="{FF2B5EF4-FFF2-40B4-BE49-F238E27FC236}">
+                    <a16:creationId xmlns:a16="http://schemas.microsoft.com/office/drawing/2014/main" id="{B960F67E-FD31-4D4F-B5BE-86B46DF86B25}"/>
+                  </a:ext>
+                </a:extLst>
+              </p:cNvPr>
+              <p:cNvCxnSpPr>
+                <a:cxnSpLocks/>
+              </p:cNvCxnSpPr>
+              <p:nvPr/>
+            </p:nvCxnSpPr>
+            <p:spPr>
+              <a:xfrm>
+                <a:off x="403026" y="17637180"/>
+                <a:ext cx="1250063" cy="0"/>
+              </a:xfrm>
+              <a:prstGeom prst="straightConnector1">
+                <a:avLst/>
+              </a:prstGeom>
+              <a:ln w="57150">
+                <a:solidFill>
+                  <a:schemeClr val="tx1"/>
+                </a:solidFill>
+                <a:headEnd type="none" w="med" len="med"/>
+                <a:tailEnd type="arrow" w="med" len="med"/>
+              </a:ln>
+            </p:spPr>
+            <p:style>
+              <a:lnRef idx="1">
+                <a:schemeClr val="accent1"/>
+              </a:lnRef>
+              <a:fillRef idx="0">
+                <a:schemeClr val="accent1"/>
+              </a:fillRef>
+              <a:effectRef idx="0">
+                <a:schemeClr val="accent1"/>
+              </a:effectRef>
+              <a:fontRef idx="minor">
+                <a:schemeClr val="tx1"/>
+              </a:fontRef>
+            </p:style>
+          </p:cxnSp>
+          <p:sp>
+            <p:nvSpPr>
+              <p:cNvPr id="79" name="Rectangle 78">
+                <a:extLst>
+                  <a:ext uri="{FF2B5EF4-FFF2-40B4-BE49-F238E27FC236}">
+                    <a16:creationId xmlns:a16="http://schemas.microsoft.com/office/drawing/2014/main" id="{C1A3F6EA-D682-F34E-B3C2-870434E86EE6}"/>
+                  </a:ext>
+                </a:extLst>
+              </p:cNvPr>
+              <p:cNvSpPr>
+                <a:spLocks noChangeAspect="1"/>
+              </p:cNvSpPr>
+              <p:nvPr/>
+            </p:nvSpPr>
+            <p:spPr>
+              <a:xfrm>
+                <a:off x="1646953" y="17267331"/>
+                <a:ext cx="731520" cy="731520"/>
+              </a:xfrm>
+              <a:prstGeom prst="rect">
+                <a:avLst/>
+              </a:prstGeom>
+              <a:solidFill>
+                <a:srgbClr val="FFFF00"/>
+              </a:solidFill>
+              <a:ln w="19050">
+                <a:solidFill>
+                  <a:schemeClr val="tx1"/>
+                </a:solidFill>
+              </a:ln>
+            </p:spPr>
+            <p:style>
+              <a:lnRef idx="2">
+                <a:schemeClr val="accent1">
+                  <a:shade val="50000"/>
+                </a:schemeClr>
+              </a:lnRef>
+              <a:fillRef idx="1">
+                <a:schemeClr val="accent1"/>
+              </a:fillRef>
+              <a:effectRef idx="0">
+                <a:schemeClr val="accent1"/>
+              </a:effectRef>
+              <a:fontRef idx="minor">
+                <a:schemeClr val="lt1"/>
+              </a:fontRef>
+            </p:style>
+            <p:txBody>
+              <a:bodyPr rtlCol="0" anchor="ctr"/>
+              <a:lstStyle/>
+              <a:p>
+                <a:pPr algn="ctr"/>
+                <a:endParaRPr lang="en-US"/>
+              </a:p>
+            </p:txBody>
+          </p:sp>
+        </p:grpSp>
+      </p:grpSp>
+      <p:grpSp>
+        <p:nvGrpSpPr>
+          <p:cNvPr id="82" name="Group 81">
+            <a:extLst>
+              <a:ext uri="{FF2B5EF4-FFF2-40B4-BE49-F238E27FC236}">
+                <a16:creationId xmlns:a16="http://schemas.microsoft.com/office/drawing/2014/main" id="{1CC17AFA-B91F-404C-8BA0-65797B376CDE}"/>
+              </a:ext>
+            </a:extLst>
+          </p:cNvPr>
+          <p:cNvGrpSpPr/>
+          <p:nvPr/>
+        </p:nvGrpSpPr>
+        <p:grpSpPr>
+          <a:xfrm>
+            <a:off x="403026" y="18853237"/>
+            <a:ext cx="5526367" cy="1323439"/>
+            <a:chOff x="403026" y="18853237"/>
+            <a:chExt cx="5526367" cy="1323439"/>
+          </a:xfrm>
+        </p:grpSpPr>
+        <p:sp>
+          <p:nvSpPr>
+            <p:cNvPr id="32" name="TextBox 31">
+              <a:extLst>
+                <a:ext uri="{FF2B5EF4-FFF2-40B4-BE49-F238E27FC236}">
+                  <a16:creationId xmlns:a16="http://schemas.microsoft.com/office/drawing/2014/main" id="{D71CD979-16FE-C64F-8C1F-595F8154B15B}"/>
+                </a:ext>
+              </a:extLst>
+            </p:cNvPr>
+            <p:cNvSpPr txBox="1"/>
+            <p:nvPr/>
+          </p:nvSpPr>
+          <p:spPr>
+            <a:xfrm>
+              <a:off x="2892087" y="18853237"/>
+              <a:ext cx="3037306" cy="1323439"/>
+            </a:xfrm>
+            <a:prstGeom prst="rect">
+              <a:avLst/>
+            </a:prstGeom>
+            <a:noFill/>
+          </p:spPr>
+          <p:txBody>
+            <a:bodyPr wrap="none" rtlCol="0">
+              <a:spAutoFit/>
+            </a:bodyPr>
+            <a:lstStyle/>
+            <a:p>
+              <a:r>
+                <a:rPr lang="en-US" sz="4000" dirty="0"/>
+                <a:t>Very intrusive</a:t>
+              </a:r>
+            </a:p>
+            <a:p>
+              <a:r>
+                <a:rPr lang="en-US" sz="4000" dirty="0"/>
+                <a:t>(penalty = 3)</a:t>
+              </a:r>
+            </a:p>
+          </p:txBody>
+        </p:sp>
+        <p:grpSp>
+          <p:nvGrpSpPr>
+            <p:cNvPr id="81" name="Group 80">
+              <a:extLst>
+                <a:ext uri="{FF2B5EF4-FFF2-40B4-BE49-F238E27FC236}">
+                  <a16:creationId xmlns:a16="http://schemas.microsoft.com/office/drawing/2014/main" id="{E2E0FB31-A9BE-8C46-BF07-CB1307AE5883}"/>
+                </a:ext>
+              </a:extLst>
+            </p:cNvPr>
+            <p:cNvGrpSpPr/>
+            <p:nvPr/>
+          </p:nvGrpSpPr>
+          <p:grpSpPr>
+            <a:xfrm>
+              <a:off x="403026" y="19078575"/>
+              <a:ext cx="1993735" cy="731520"/>
+              <a:chOff x="403026" y="19078575"/>
+              <a:chExt cx="1993735" cy="731520"/>
+            </a:xfrm>
+          </p:grpSpPr>
+          <p:cxnSp>
+            <p:nvCxnSpPr>
+              <p:cNvPr id="35" name="Straight Arrow Connector 34">
+                <a:extLst>
+                  <a:ext uri="{FF2B5EF4-FFF2-40B4-BE49-F238E27FC236}">
+                    <a16:creationId xmlns:a16="http://schemas.microsoft.com/office/drawing/2014/main" id="{9EB6EB0E-1015-B04E-B4A5-9282A386CF4C}"/>
+                  </a:ext>
+                </a:extLst>
+              </p:cNvPr>
+              <p:cNvCxnSpPr>
+                <a:cxnSpLocks/>
+              </p:cNvCxnSpPr>
+              <p:nvPr/>
+            </p:nvCxnSpPr>
+            <p:spPr>
+              <a:xfrm>
+                <a:off x="403026" y="19514957"/>
+                <a:ext cx="1250063" cy="0"/>
+              </a:xfrm>
+              <a:prstGeom prst="straightConnector1">
+                <a:avLst/>
+              </a:prstGeom>
+              <a:ln w="57150">
+                <a:solidFill>
+                  <a:schemeClr val="tx1"/>
+                </a:solidFill>
+                <a:headEnd type="none" w="med" len="med"/>
+                <a:tailEnd type="arrow" w="med" len="med"/>
+              </a:ln>
+            </p:spPr>
+            <p:style>
+              <a:lnRef idx="1">
+                <a:schemeClr val="accent1"/>
+              </a:lnRef>
+              <a:fillRef idx="0">
+                <a:schemeClr val="accent1"/>
+              </a:fillRef>
+              <a:effectRef idx="0">
+                <a:schemeClr val="accent1"/>
+              </a:effectRef>
+              <a:fontRef idx="minor">
+                <a:schemeClr val="tx1"/>
+              </a:fontRef>
+            </p:style>
+          </p:cxnSp>
+          <p:sp>
+            <p:nvSpPr>
+              <p:cNvPr id="80" name="Regular Pentagon 79">
+                <a:extLst>
+                  <a:ext uri="{FF2B5EF4-FFF2-40B4-BE49-F238E27FC236}">
+                    <a16:creationId xmlns:a16="http://schemas.microsoft.com/office/drawing/2014/main" id="{B04623BB-D498-C349-9130-7F17ACAF04F7}"/>
+                  </a:ext>
+                </a:extLst>
+              </p:cNvPr>
+              <p:cNvSpPr>
+                <a:spLocks noChangeAspect="1"/>
+              </p:cNvSpPr>
+              <p:nvPr/>
+            </p:nvSpPr>
+            <p:spPr>
+              <a:xfrm>
+                <a:off x="1628665" y="19078575"/>
+                <a:ext cx="768096" cy="731520"/>
+              </a:xfrm>
+              <a:prstGeom prst="pentagon">
+                <a:avLst/>
+              </a:prstGeom>
+              <a:solidFill>
+                <a:srgbClr val="FF0000"/>
+              </a:solidFill>
+              <a:ln w="19050">
+                <a:solidFill>
+                  <a:schemeClr val="tx1"/>
+                </a:solidFill>
+              </a:ln>
+            </p:spPr>
+            <p:style>
+              <a:lnRef idx="2">
+                <a:schemeClr val="accent1">
+                  <a:shade val="50000"/>
+                </a:schemeClr>
+              </a:lnRef>
+              <a:fillRef idx="1">
+                <a:schemeClr val="accent1"/>
+              </a:fillRef>
+              <a:effectRef idx="0">
+                <a:schemeClr val="accent1"/>
+              </a:effectRef>
+              <a:fontRef idx="minor">
+                <a:schemeClr val="lt1"/>
+              </a:fontRef>
+            </p:style>
+            <p:txBody>
+              <a:bodyPr rtlCol="0" anchor="ctr"/>
+              <a:lstStyle/>
+              <a:p>
+                <a:pPr algn="ctr"/>
+                <a:endParaRPr lang="en-US"/>
+              </a:p>
+            </p:txBody>
+          </p:sp>
         </p:grpSp>
       </p:grpSp>
     </p:spTree>

</xml_diff>

<commit_message>
updated obstacle notation in mobilerobot-legend-color-blind-friendly.pptx and added 'map is drawn to scale'
</commit_message>
<xml_diff>
--- a/XPlanningEvaluation/data/legend/mobilerobot-legend-color-blind-friendly.pptx
+++ b/XPlanningEvaluation/data/legend/mobilerobot-legend-color-blind-friendly.pptx
@@ -197,7 +197,7 @@
           <a:p>
             <a:fld id="{AC1D5B16-E437-6343-9361-CFC6BDADB949}" type="datetimeFigureOut">
               <a:rPr lang="en-US" smtClean="0"/>
-              <a:t>9/9/19</a:t>
+              <a:t>9/13/19</a:t>
             </a:fld>
             <a:endParaRPr lang="en-US"/>
           </a:p>
@@ -749,7 +749,7 @@
           <a:p>
             <a:fld id="{117BC45A-752C-174D-BFB4-5EE0276A99CB}" type="datetimeFigureOut">
               <a:rPr lang="en-US" smtClean="0"/>
-              <a:t>9/9/19</a:t>
+              <a:t>9/13/19</a:t>
             </a:fld>
             <a:endParaRPr lang="en-US"/>
           </a:p>
@@ -919,7 +919,7 @@
           <a:p>
             <a:fld id="{117BC45A-752C-174D-BFB4-5EE0276A99CB}" type="datetimeFigureOut">
               <a:rPr lang="en-US" smtClean="0"/>
-              <a:t>9/9/19</a:t>
+              <a:t>9/13/19</a:t>
             </a:fld>
             <a:endParaRPr lang="en-US"/>
           </a:p>
@@ -1099,7 +1099,7 @@
           <a:p>
             <a:fld id="{117BC45A-752C-174D-BFB4-5EE0276A99CB}" type="datetimeFigureOut">
               <a:rPr lang="en-US" smtClean="0"/>
-              <a:t>9/9/19</a:t>
+              <a:t>9/13/19</a:t>
             </a:fld>
             <a:endParaRPr lang="en-US"/>
           </a:p>
@@ -1269,7 +1269,7 @@
           <a:p>
             <a:fld id="{117BC45A-752C-174D-BFB4-5EE0276A99CB}" type="datetimeFigureOut">
               <a:rPr lang="en-US" smtClean="0"/>
-              <a:t>9/9/19</a:t>
+              <a:t>9/13/19</a:t>
             </a:fld>
             <a:endParaRPr lang="en-US"/>
           </a:p>
@@ -1513,7 +1513,7 @@
           <a:p>
             <a:fld id="{117BC45A-752C-174D-BFB4-5EE0276A99CB}" type="datetimeFigureOut">
               <a:rPr lang="en-US" smtClean="0"/>
-              <a:t>9/9/19</a:t>
+              <a:t>9/13/19</a:t>
             </a:fld>
             <a:endParaRPr lang="en-US"/>
           </a:p>
@@ -1745,7 +1745,7 @@
           <a:p>
             <a:fld id="{117BC45A-752C-174D-BFB4-5EE0276A99CB}" type="datetimeFigureOut">
               <a:rPr lang="en-US" smtClean="0"/>
-              <a:t>9/9/19</a:t>
+              <a:t>9/13/19</a:t>
             </a:fld>
             <a:endParaRPr lang="en-US"/>
           </a:p>
@@ -2112,7 +2112,7 @@
           <a:p>
             <a:fld id="{117BC45A-752C-174D-BFB4-5EE0276A99CB}" type="datetimeFigureOut">
               <a:rPr lang="en-US" smtClean="0"/>
-              <a:t>9/9/19</a:t>
+              <a:t>9/13/19</a:t>
             </a:fld>
             <a:endParaRPr lang="en-US"/>
           </a:p>
@@ -2230,7 +2230,7 @@
           <a:p>
             <a:fld id="{117BC45A-752C-174D-BFB4-5EE0276A99CB}" type="datetimeFigureOut">
               <a:rPr lang="en-US" smtClean="0"/>
-              <a:t>9/9/19</a:t>
+              <a:t>9/13/19</a:t>
             </a:fld>
             <a:endParaRPr lang="en-US"/>
           </a:p>
@@ -2325,7 +2325,7 @@
           <a:p>
             <a:fld id="{117BC45A-752C-174D-BFB4-5EE0276A99CB}" type="datetimeFigureOut">
               <a:rPr lang="en-US" smtClean="0"/>
-              <a:t>9/9/19</a:t>
+              <a:t>9/13/19</a:t>
             </a:fld>
             <a:endParaRPr lang="en-US"/>
           </a:p>
@@ -2602,7 +2602,7 @@
           <a:p>
             <a:fld id="{117BC45A-752C-174D-BFB4-5EE0276A99CB}" type="datetimeFigureOut">
               <a:rPr lang="en-US" smtClean="0"/>
-              <a:t>9/9/19</a:t>
+              <a:t>9/13/19</a:t>
             </a:fld>
             <a:endParaRPr lang="en-US"/>
           </a:p>
@@ -2859,7 +2859,7 @@
           <a:p>
             <a:fld id="{117BC45A-752C-174D-BFB4-5EE0276A99CB}" type="datetimeFigureOut">
               <a:rPr lang="en-US" smtClean="0"/>
-              <a:t>9/9/19</a:t>
+              <a:t>9/13/19</a:t>
             </a:fld>
             <a:endParaRPr lang="en-US"/>
           </a:p>
@@ -3072,7 +3072,7 @@
           <a:p>
             <a:fld id="{117BC45A-752C-174D-BFB4-5EE0276A99CB}" type="datetimeFigureOut">
               <a:rPr lang="en-US" smtClean="0"/>
-              <a:t>9/9/19</a:t>
+              <a:t>9/13/19</a:t>
             </a:fld>
             <a:endParaRPr lang="en-US"/>
           </a:p>
@@ -3491,8 +3491,8 @@
         </p:nvSpPr>
         <p:spPr>
           <a:xfrm>
-            <a:off x="8211" y="13679369"/>
-            <a:ext cx="8001000" cy="14923980"/>
+            <a:off x="8211" y="14465609"/>
+            <a:ext cx="8001000" cy="14137739"/>
           </a:xfrm>
           <a:prstGeom prst="rect">
             <a:avLst/>
@@ -3641,337 +3641,6 @@
           </p:txBody>
         </p:sp>
       </p:grpSp>
-      <p:grpSp>
-        <p:nvGrpSpPr>
-          <p:cNvPr id="78" name="Group 77">
-            <a:extLst>
-              <a:ext uri="{FF2B5EF4-FFF2-40B4-BE49-F238E27FC236}">
-                <a16:creationId xmlns:a16="http://schemas.microsoft.com/office/drawing/2014/main" id="{7706F1E0-8435-0043-A350-7F811DAFE5A9}"/>
-              </a:ext>
-            </a:extLst>
-          </p:cNvPr>
-          <p:cNvGrpSpPr/>
-          <p:nvPr/>
-        </p:nvGrpSpPr>
-        <p:grpSpPr>
-          <a:xfrm>
-            <a:off x="403017" y="4592906"/>
-            <a:ext cx="6512847" cy="2057809"/>
-            <a:chOff x="403017" y="4480641"/>
-            <a:chExt cx="6512847" cy="2057809"/>
-          </a:xfrm>
-        </p:grpSpPr>
-        <p:grpSp>
-          <p:nvGrpSpPr>
-            <p:cNvPr id="14" name="Group 13">
-              <a:extLst>
-                <a:ext uri="{FF2B5EF4-FFF2-40B4-BE49-F238E27FC236}">
-                  <a16:creationId xmlns:a16="http://schemas.microsoft.com/office/drawing/2014/main" id="{B0A73490-7A63-214B-9963-653BDB0FB661}"/>
-                </a:ext>
-              </a:extLst>
-            </p:cNvPr>
-            <p:cNvGrpSpPr/>
-            <p:nvPr/>
-          </p:nvGrpSpPr>
-          <p:grpSpPr>
-            <a:xfrm>
-              <a:off x="403023" y="4480641"/>
-              <a:ext cx="6487187" cy="707886"/>
-              <a:chOff x="403023" y="5813143"/>
-              <a:chExt cx="6487187" cy="707886"/>
-            </a:xfrm>
-          </p:grpSpPr>
-          <p:grpSp>
-            <p:nvGrpSpPr>
-              <p:cNvPr id="20" name="Group 19">
-                <a:extLst>
-                  <a:ext uri="{FF2B5EF4-FFF2-40B4-BE49-F238E27FC236}">
-                    <a16:creationId xmlns:a16="http://schemas.microsoft.com/office/drawing/2014/main" id="{24431A3B-F2CC-494F-B4AC-A8C9A0253BD2}"/>
-                  </a:ext>
-                </a:extLst>
-              </p:cNvPr>
-              <p:cNvGrpSpPr/>
-              <p:nvPr/>
-            </p:nvGrpSpPr>
-            <p:grpSpPr>
-              <a:xfrm>
-                <a:off x="403023" y="5813143"/>
-                <a:ext cx="2242632" cy="707886"/>
-                <a:chOff x="403023" y="5786717"/>
-                <a:chExt cx="2242632" cy="707886"/>
-              </a:xfrm>
-            </p:grpSpPr>
-            <p:sp>
-              <p:nvSpPr>
-                <p:cNvPr id="22" name="TextBox 21">
-                  <a:extLst>
-                    <a:ext uri="{FF2B5EF4-FFF2-40B4-BE49-F238E27FC236}">
-                      <a16:creationId xmlns:a16="http://schemas.microsoft.com/office/drawing/2014/main" id="{6B812E99-C4DD-0A49-8E1B-6DA0788A3D1E}"/>
-                    </a:ext>
-                  </a:extLst>
-                </p:cNvPr>
-                <p:cNvSpPr txBox="1"/>
-                <p:nvPr/>
-              </p:nvSpPr>
-              <p:spPr>
-                <a:xfrm>
-                  <a:off x="1129840" y="5786717"/>
-                  <a:ext cx="760144" cy="707886"/>
-                </a:xfrm>
-                <a:prstGeom prst="rect">
-                  <a:avLst/>
-                </a:prstGeom>
-                <a:noFill/>
-              </p:spPr>
-              <p:txBody>
-                <a:bodyPr wrap="none" rtlCol="0">
-                  <a:spAutoFit/>
-                </a:bodyPr>
-                <a:lstStyle/>
-                <a:p>
-                  <a:r>
-                    <a:rPr lang="en-US" sz="4000" dirty="0"/>
-                    <a:t>SO</a:t>
-                  </a:r>
-                </a:p>
-              </p:txBody>
-            </p:sp>
-            <p:cxnSp>
-              <p:nvCxnSpPr>
-                <p:cNvPr id="23" name="Straight Connector 22">
-                  <a:extLst>
-                    <a:ext uri="{FF2B5EF4-FFF2-40B4-BE49-F238E27FC236}">
-                      <a16:creationId xmlns:a16="http://schemas.microsoft.com/office/drawing/2014/main" id="{905FC67B-F8AE-BF44-86ED-97AEF21B3023}"/>
-                    </a:ext>
-                  </a:extLst>
-                </p:cNvPr>
-                <p:cNvCxnSpPr>
-                  <a:cxnSpLocks/>
-                </p:cNvCxnSpPr>
-                <p:nvPr/>
-              </p:nvCxnSpPr>
-              <p:spPr>
-                <a:xfrm>
-                  <a:off x="403023" y="6494602"/>
-                  <a:ext cx="2242632" cy="0"/>
-                </a:xfrm>
-                <a:prstGeom prst="line">
-                  <a:avLst/>
-                </a:prstGeom>
-                <a:ln w="57150">
-                  <a:solidFill>
-                    <a:schemeClr val="tx1"/>
-                  </a:solidFill>
-                </a:ln>
-              </p:spPr>
-              <p:style>
-                <a:lnRef idx="1">
-                  <a:schemeClr val="accent1"/>
-                </a:lnRef>
-                <a:fillRef idx="0">
-                  <a:schemeClr val="accent1"/>
-                </a:fillRef>
-                <a:effectRef idx="0">
-                  <a:schemeClr val="accent1"/>
-                </a:effectRef>
-                <a:fontRef idx="minor">
-                  <a:schemeClr val="tx1"/>
-                </a:fontRef>
-              </p:style>
-            </p:cxnSp>
-          </p:grpSp>
-          <p:sp>
-            <p:nvSpPr>
-              <p:cNvPr id="21" name="TextBox 20">
-                <a:extLst>
-                  <a:ext uri="{FF2B5EF4-FFF2-40B4-BE49-F238E27FC236}">
-                    <a16:creationId xmlns:a16="http://schemas.microsoft.com/office/drawing/2014/main" id="{16B85D6F-25AA-C54B-9687-8A7129F1586F}"/>
-                  </a:ext>
-                </a:extLst>
-              </p:cNvPr>
-              <p:cNvSpPr txBox="1"/>
-              <p:nvPr/>
-            </p:nvSpPr>
-            <p:spPr>
-              <a:xfrm>
-                <a:off x="3052810" y="5813143"/>
-                <a:ext cx="3837400" cy="707885"/>
-              </a:xfrm>
-              <a:prstGeom prst="rect">
-                <a:avLst/>
-              </a:prstGeom>
-              <a:noFill/>
-            </p:spPr>
-            <p:txBody>
-              <a:bodyPr wrap="square" rtlCol="0">
-                <a:spAutoFit/>
-              </a:bodyPr>
-              <a:lstStyle/>
-              <a:p>
-                <a:r>
-                  <a:rPr lang="en-US" sz="4000" dirty="0"/>
-                  <a:t>Sparse Obstacles</a:t>
-                </a:r>
-              </a:p>
-            </p:txBody>
-          </p:sp>
-        </p:grpSp>
-        <p:grpSp>
-          <p:nvGrpSpPr>
-            <p:cNvPr id="76" name="Group 75">
-              <a:extLst>
-                <a:ext uri="{FF2B5EF4-FFF2-40B4-BE49-F238E27FC236}">
-                  <a16:creationId xmlns:a16="http://schemas.microsoft.com/office/drawing/2014/main" id="{538DADBD-F590-A44D-B9E5-AB1A3A7763FB}"/>
-                </a:ext>
-              </a:extLst>
-            </p:cNvPr>
-            <p:cNvGrpSpPr/>
-            <p:nvPr/>
-          </p:nvGrpSpPr>
-          <p:grpSpPr>
-            <a:xfrm>
-              <a:off x="403017" y="5830564"/>
-              <a:ext cx="6512847" cy="707886"/>
-              <a:chOff x="403017" y="7009487"/>
-              <a:chExt cx="6512847" cy="707886"/>
-            </a:xfrm>
-          </p:grpSpPr>
-          <p:grpSp>
-            <p:nvGrpSpPr>
-              <p:cNvPr id="75" name="Group 74">
-                <a:extLst>
-                  <a:ext uri="{FF2B5EF4-FFF2-40B4-BE49-F238E27FC236}">
-                    <a16:creationId xmlns:a16="http://schemas.microsoft.com/office/drawing/2014/main" id="{12BDB75B-B98F-B540-9F30-37D72B5687B5}"/>
-                  </a:ext>
-                </a:extLst>
-              </p:cNvPr>
-              <p:cNvGrpSpPr/>
-              <p:nvPr/>
-            </p:nvGrpSpPr>
-            <p:grpSpPr>
-              <a:xfrm>
-                <a:off x="403017" y="7009487"/>
-                <a:ext cx="2242632" cy="707886"/>
-                <a:chOff x="403017" y="7009487"/>
-                <a:chExt cx="2242632" cy="707886"/>
-              </a:xfrm>
-            </p:grpSpPr>
-            <p:sp>
-              <p:nvSpPr>
-                <p:cNvPr id="18" name="TextBox 17">
-                  <a:extLst>
-                    <a:ext uri="{FF2B5EF4-FFF2-40B4-BE49-F238E27FC236}">
-                      <a16:creationId xmlns:a16="http://schemas.microsoft.com/office/drawing/2014/main" id="{B3771149-69AD-1848-B985-A3EB952B9BCA}"/>
-                    </a:ext>
-                  </a:extLst>
-                </p:cNvPr>
-                <p:cNvSpPr txBox="1"/>
-                <p:nvPr/>
-              </p:nvSpPr>
-              <p:spPr>
-                <a:xfrm>
-                  <a:off x="1104186" y="7009487"/>
-                  <a:ext cx="840295" cy="707886"/>
-                </a:xfrm>
-                <a:prstGeom prst="rect">
-                  <a:avLst/>
-                </a:prstGeom>
-                <a:noFill/>
-              </p:spPr>
-              <p:txBody>
-                <a:bodyPr wrap="none" rtlCol="0">
-                  <a:spAutoFit/>
-                </a:bodyPr>
-                <a:lstStyle/>
-                <a:p>
-                  <a:r>
-                    <a:rPr lang="en-US" sz="4000" dirty="0"/>
-                    <a:t>DO</a:t>
-                  </a:r>
-                </a:p>
-              </p:txBody>
-            </p:sp>
-            <p:cxnSp>
-              <p:nvCxnSpPr>
-                <p:cNvPr id="19" name="Straight Connector 18">
-                  <a:extLst>
-                    <a:ext uri="{FF2B5EF4-FFF2-40B4-BE49-F238E27FC236}">
-                      <a16:creationId xmlns:a16="http://schemas.microsoft.com/office/drawing/2014/main" id="{8B4914A2-DE96-A640-9189-A08008CFF4F2}"/>
-                    </a:ext>
-                  </a:extLst>
-                </p:cNvPr>
-                <p:cNvCxnSpPr>
-                  <a:cxnSpLocks/>
-                </p:cNvCxnSpPr>
-                <p:nvPr/>
-              </p:nvCxnSpPr>
-              <p:spPr>
-                <a:xfrm>
-                  <a:off x="403017" y="7717373"/>
-                  <a:ext cx="2242632" cy="0"/>
-                </a:xfrm>
-                <a:prstGeom prst="line">
-                  <a:avLst/>
-                </a:prstGeom>
-                <a:ln w="57150">
-                  <a:solidFill>
-                    <a:schemeClr val="tx1"/>
-                  </a:solidFill>
-                </a:ln>
-              </p:spPr>
-              <p:style>
-                <a:lnRef idx="1">
-                  <a:schemeClr val="accent1"/>
-                </a:lnRef>
-                <a:fillRef idx="0">
-                  <a:schemeClr val="accent1"/>
-                </a:fillRef>
-                <a:effectRef idx="0">
-                  <a:schemeClr val="accent1"/>
-                </a:effectRef>
-                <a:fontRef idx="minor">
-                  <a:schemeClr val="tx1"/>
-                </a:fontRef>
-              </p:style>
-            </p:cxnSp>
-          </p:grpSp>
-          <p:sp>
-            <p:nvSpPr>
-              <p:cNvPr id="17" name="TextBox 16">
-                <a:extLst>
-                  <a:ext uri="{FF2B5EF4-FFF2-40B4-BE49-F238E27FC236}">
-                    <a16:creationId xmlns:a16="http://schemas.microsoft.com/office/drawing/2014/main" id="{202ABB01-425A-894E-93E6-BDB6EE5F202C}"/>
-                  </a:ext>
-                </a:extLst>
-              </p:cNvPr>
-              <p:cNvSpPr txBox="1"/>
-              <p:nvPr/>
-            </p:nvSpPr>
-            <p:spPr>
-              <a:xfrm>
-                <a:off x="3023279" y="7009487"/>
-                <a:ext cx="3892585" cy="707886"/>
-              </a:xfrm>
-              <a:prstGeom prst="rect">
-                <a:avLst/>
-              </a:prstGeom>
-              <a:noFill/>
-            </p:spPr>
-            <p:txBody>
-              <a:bodyPr wrap="square" rtlCol="0">
-                <a:spAutoFit/>
-              </a:bodyPr>
-              <a:lstStyle/>
-              <a:p>
-                <a:r>
-                  <a:rPr lang="en-US" sz="4000" dirty="0"/>
-                  <a:t>Dense Obstacles</a:t>
-                </a:r>
-              </a:p>
-            </p:txBody>
-          </p:sp>
-        </p:grpSp>
-      </p:grpSp>
       <p:sp>
         <p:nvSpPr>
           <p:cNvPr id="24" name="Rectangle 23">
@@ -3987,7 +3656,7 @@
         <p:spPr>
           <a:xfrm>
             <a:off x="8211" y="12700"/>
-            <a:ext cx="8001000" cy="9171749"/>
+            <a:ext cx="8001000" cy="9885653"/>
           </a:xfrm>
           <a:prstGeom prst="rect">
             <a:avLst/>
@@ -4038,8 +3707,8 @@
         </p:nvSpPr>
         <p:spPr>
           <a:xfrm>
-            <a:off x="8211" y="9177520"/>
-            <a:ext cx="8001000" cy="4501700"/>
+            <a:off x="8211" y="9896397"/>
+            <a:ext cx="8001000" cy="4567885"/>
           </a:xfrm>
           <a:prstGeom prst="rect">
             <a:avLst/>
@@ -4125,7 +3794,7 @@
         </p:nvGrpSpPr>
         <p:grpSpPr>
           <a:xfrm>
-            <a:off x="403026" y="15048834"/>
+            <a:off x="403026" y="15779189"/>
             <a:ext cx="5661823" cy="1323439"/>
             <a:chOff x="403026" y="15801450"/>
             <a:chExt cx="5661823" cy="1323439"/>
@@ -4309,7 +3978,7 @@
         </p:nvSpPr>
         <p:spPr>
           <a:xfrm>
-            <a:off x="403017" y="13994695"/>
+            <a:off x="403017" y="14725050"/>
             <a:ext cx="3135410" cy="738664"/>
           </a:xfrm>
           <a:prstGeom prst="rect">
@@ -4344,7 +4013,7 @@
         </p:nvSpPr>
         <p:spPr>
           <a:xfrm>
-            <a:off x="403017" y="9312833"/>
+            <a:off x="403017" y="10045043"/>
             <a:ext cx="3275256" cy="738664"/>
           </a:xfrm>
           <a:prstGeom prst="rect">
@@ -4379,7 +4048,7 @@
         </p:nvGrpSpPr>
         <p:grpSpPr>
           <a:xfrm>
-            <a:off x="403017" y="10383446"/>
+            <a:off x="403017" y="11115656"/>
             <a:ext cx="6871793" cy="1323439"/>
             <a:chOff x="403017" y="12261608"/>
             <a:chExt cx="6871793" cy="1323439"/>
@@ -4494,7 +4163,7 @@
         </p:nvGrpSpPr>
         <p:grpSpPr>
           <a:xfrm>
-            <a:off x="403017" y="12063072"/>
+            <a:off x="403017" y="12795282"/>
             <a:ext cx="6868392" cy="1323439"/>
             <a:chOff x="403017" y="13535837"/>
             <a:chExt cx="6868392" cy="1323439"/>
@@ -4595,12 +4264,47 @@
           </p:txBody>
         </p:sp>
       </p:grpSp>
+      <p:sp>
+        <p:nvSpPr>
+          <p:cNvPr id="53" name="TextBox 52">
+            <a:extLst>
+              <a:ext uri="{FF2B5EF4-FFF2-40B4-BE49-F238E27FC236}">
+                <a16:creationId xmlns:a16="http://schemas.microsoft.com/office/drawing/2014/main" id="{81A52688-96DB-2140-A808-A3F2EC0E9259}"/>
+              </a:ext>
+            </a:extLst>
+          </p:cNvPr>
+          <p:cNvSpPr txBox="1"/>
+          <p:nvPr/>
+        </p:nvSpPr>
+        <p:spPr>
+          <a:xfrm>
+            <a:off x="403017" y="21290055"/>
+            <a:ext cx="2085827" cy="738664"/>
+          </a:xfrm>
+          <a:prstGeom prst="rect">
+            <a:avLst/>
+          </a:prstGeom>
+          <a:noFill/>
+        </p:spPr>
+        <p:txBody>
+          <a:bodyPr wrap="none" rtlCol="0">
+            <a:spAutoFit/>
+          </a:bodyPr>
+          <a:lstStyle/>
+          <a:p>
+            <a:r>
+              <a:rPr lang="en-US" sz="4200" b="1" dirty="0"/>
+              <a:t>Collision</a:t>
+            </a:r>
+          </a:p>
+        </p:txBody>
+      </p:sp>
       <p:grpSp>
         <p:nvGrpSpPr>
-          <p:cNvPr id="13" name="Group 12">
+          <p:cNvPr id="54" name="Group 53">
             <a:extLst>
               <a:ext uri="{FF2B5EF4-FFF2-40B4-BE49-F238E27FC236}">
-                <a16:creationId xmlns:a16="http://schemas.microsoft.com/office/drawing/2014/main" id="{8D2A2BBD-8AEC-8641-BEE1-A86E367D2DCE}"/>
+                <a16:creationId xmlns:a16="http://schemas.microsoft.com/office/drawing/2014/main" id="{5D98740F-F070-2B4E-8CCA-FB04BF7AA32C}"/>
               </a:ext>
             </a:extLst>
           </p:cNvPr>
@@ -4609,18 +4313,18 @@
         </p:nvGrpSpPr>
         <p:grpSpPr>
           <a:xfrm>
-            <a:off x="390672" y="20889819"/>
-            <a:ext cx="7389479" cy="6957514"/>
-            <a:chOff x="390672" y="20889819"/>
-            <a:chExt cx="7389479" cy="6957514"/>
+            <a:off x="403017" y="22412665"/>
+            <a:ext cx="7377134" cy="1400767"/>
+            <a:chOff x="403017" y="22855622"/>
+            <a:chExt cx="7377134" cy="1400767"/>
           </a:xfrm>
         </p:grpSpPr>
         <p:sp>
           <p:nvSpPr>
-            <p:cNvPr id="53" name="TextBox 52">
+            <p:cNvPr id="65" name="TextBox 64">
               <a:extLst>
                 <a:ext uri="{FF2B5EF4-FFF2-40B4-BE49-F238E27FC236}">
-                  <a16:creationId xmlns:a16="http://schemas.microsoft.com/office/drawing/2014/main" id="{81A52688-96DB-2140-A808-A3F2EC0E9259}"/>
+                  <a16:creationId xmlns:a16="http://schemas.microsoft.com/office/drawing/2014/main" id="{628BD2FA-8CEC-7A4A-AF2D-4B1214B392B7}"/>
                 </a:ext>
               </a:extLst>
             </p:cNvPr>
@@ -4629,8 +4333,8 @@
           </p:nvSpPr>
           <p:spPr>
             <a:xfrm>
-              <a:off x="403017" y="20889819"/>
-              <a:ext cx="2085827" cy="738664"/>
+              <a:off x="3040461" y="22932950"/>
+              <a:ext cx="4739690" cy="1323439"/>
             </a:xfrm>
             <a:prstGeom prst="rect">
               <a:avLst/>
@@ -4638,24 +4342,31 @@
             <a:noFill/>
           </p:spPr>
           <p:txBody>
-            <a:bodyPr wrap="none" rtlCol="0">
+            <a:bodyPr wrap="square" rtlCol="0">
               <a:spAutoFit/>
             </a:bodyPr>
             <a:lstStyle/>
             <a:p>
               <a:r>
-                <a:rPr lang="en-US" sz="4200" b="1" dirty="0"/>
-                <a:t>Collision</a:t>
+                <a:rPr lang="en-US" sz="4000" dirty="0"/>
+                <a:t>No collision</a:t>
+              </a:r>
+              <a:br>
+                <a:rPr lang="en-US" sz="4000" dirty="0"/>
+              </a:br>
+              <a:r>
+                <a:rPr lang="en-US" sz="4000" dirty="0"/>
+                <a:t>at half speed</a:t>
               </a:r>
             </a:p>
           </p:txBody>
         </p:sp>
         <p:grpSp>
           <p:nvGrpSpPr>
-            <p:cNvPr id="54" name="Group 53">
+            <p:cNvPr id="66" name="Group 65">
               <a:extLst>
                 <a:ext uri="{FF2B5EF4-FFF2-40B4-BE49-F238E27FC236}">
-                  <a16:creationId xmlns:a16="http://schemas.microsoft.com/office/drawing/2014/main" id="{5D98740F-F070-2B4E-8CCA-FB04BF7AA32C}"/>
+                  <a16:creationId xmlns:a16="http://schemas.microsoft.com/office/drawing/2014/main" id="{8473638E-3201-734A-90C1-262CF659953F}"/>
                 </a:ext>
               </a:extLst>
             </p:cNvPr>
@@ -4664,18 +4375,18 @@
           </p:nvGrpSpPr>
           <p:grpSpPr>
             <a:xfrm>
-              <a:off x="403017" y="22014085"/>
-              <a:ext cx="7377134" cy="1400767"/>
-              <a:chOff x="403017" y="22855622"/>
-              <a:chExt cx="7377134" cy="1400767"/>
+              <a:off x="403017" y="22855622"/>
+              <a:ext cx="2240280" cy="953982"/>
+              <a:chOff x="403017" y="22882158"/>
+              <a:chExt cx="2240280" cy="953982"/>
             </a:xfrm>
           </p:grpSpPr>
           <p:sp>
             <p:nvSpPr>
-              <p:cNvPr id="65" name="TextBox 64">
+              <p:cNvPr id="67" name="TextBox 66">
                 <a:extLst>
                   <a:ext uri="{FF2B5EF4-FFF2-40B4-BE49-F238E27FC236}">
-                    <a16:creationId xmlns:a16="http://schemas.microsoft.com/office/drawing/2014/main" id="{628BD2FA-8CEC-7A4A-AF2D-4B1214B392B7}"/>
+                    <a16:creationId xmlns:a16="http://schemas.microsoft.com/office/drawing/2014/main" id="{CEC5C8CA-E51E-414A-BCAC-E7B7D8D2DC32}"/>
                   </a:ext>
                 </a:extLst>
               </p:cNvPr>
@@ -4684,8 +4395,8 @@
             </p:nvSpPr>
             <p:spPr>
               <a:xfrm>
-                <a:off x="3040461" y="22932950"/>
-                <a:ext cx="4739690" cy="1323439"/>
+                <a:off x="1271326" y="22882158"/>
+                <a:ext cx="503663" cy="862542"/>
               </a:xfrm>
               <a:prstGeom prst="rect">
                 <a:avLst/>
@@ -4693,475 +4404,70 @@
               <a:noFill/>
             </p:spPr>
             <p:txBody>
-              <a:bodyPr wrap="square" rtlCol="0">
+              <a:bodyPr wrap="none" rtlCol="0">
                 <a:spAutoFit/>
               </a:bodyPr>
               <a:lstStyle/>
               <a:p>
                 <a:r>
-                  <a:rPr lang="en-US" sz="4000" dirty="0"/>
-                  <a:t>No collision</a:t>
-                </a:r>
-                <a:br>
-                  <a:rPr lang="en-US" sz="4000" dirty="0"/>
-                </a:br>
-                <a:r>
-                  <a:rPr lang="en-US" sz="4000" dirty="0"/>
-                  <a:t>at half speed</a:t>
+                  <a:rPr lang="en-US" sz="5005" dirty="0"/>
+                  <a:t>*</a:t>
                 </a:r>
               </a:p>
             </p:txBody>
           </p:sp>
-          <p:grpSp>
-            <p:nvGrpSpPr>
-              <p:cNvPr id="66" name="Group 65">
+          <p:sp>
+            <p:nvSpPr>
+              <p:cNvPr id="68" name="Rectangle 67">
                 <a:extLst>
                   <a:ext uri="{FF2B5EF4-FFF2-40B4-BE49-F238E27FC236}">
-                    <a16:creationId xmlns:a16="http://schemas.microsoft.com/office/drawing/2014/main" id="{8473638E-3201-734A-90C1-262CF659953F}"/>
+                    <a16:creationId xmlns:a16="http://schemas.microsoft.com/office/drawing/2014/main" id="{7FA95D73-E07F-8549-957A-72DE31BC8A0B}"/>
                   </a:ext>
                 </a:extLst>
               </p:cNvPr>
-              <p:cNvGrpSpPr/>
-              <p:nvPr/>
-            </p:nvGrpSpPr>
-            <p:grpSpPr>
-              <a:xfrm>
-                <a:off x="403017" y="22855622"/>
-                <a:ext cx="2240280" cy="953982"/>
-                <a:chOff x="403017" y="22882158"/>
-                <a:chExt cx="2240280" cy="953982"/>
-              </a:xfrm>
-            </p:grpSpPr>
-            <p:sp>
-              <p:nvSpPr>
-                <p:cNvPr id="67" name="TextBox 66">
-                  <a:extLst>
-                    <a:ext uri="{FF2B5EF4-FFF2-40B4-BE49-F238E27FC236}">
-                      <a16:creationId xmlns:a16="http://schemas.microsoft.com/office/drawing/2014/main" id="{CEC5C8CA-E51E-414A-BCAC-E7B7D8D2DC32}"/>
-                    </a:ext>
-                  </a:extLst>
-                </p:cNvPr>
-                <p:cNvSpPr txBox="1"/>
-                <p:nvPr/>
-              </p:nvSpPr>
-              <p:spPr>
-                <a:xfrm>
-                  <a:off x="1271326" y="22882158"/>
-                  <a:ext cx="503663" cy="862542"/>
-                </a:xfrm>
-                <a:prstGeom prst="rect">
-                  <a:avLst/>
-                </a:prstGeom>
-                <a:noFill/>
-              </p:spPr>
-              <p:txBody>
-                <a:bodyPr wrap="none" rtlCol="0">
-                  <a:spAutoFit/>
-                </a:bodyPr>
-                <a:lstStyle/>
-                <a:p>
-                  <a:r>
-                    <a:rPr lang="en-US" sz="5005" dirty="0"/>
-                    <a:t>*</a:t>
-                  </a:r>
-                </a:p>
-              </p:txBody>
-            </p:sp>
-            <p:sp>
-              <p:nvSpPr>
-                <p:cNvPr id="68" name="Rectangle 67">
-                  <a:extLst>
-                    <a:ext uri="{FF2B5EF4-FFF2-40B4-BE49-F238E27FC236}">
-                      <a16:creationId xmlns:a16="http://schemas.microsoft.com/office/drawing/2014/main" id="{7FA95D73-E07F-8549-957A-72DE31BC8A0B}"/>
-                    </a:ext>
-                  </a:extLst>
-                </p:cNvPr>
-                <p:cNvSpPr/>
-                <p:nvPr/>
-              </p:nvSpPr>
-              <p:spPr>
-                <a:xfrm>
-                  <a:off x="403017" y="23561820"/>
-                  <a:ext cx="2240280" cy="274320"/>
-                </a:xfrm>
-                <a:prstGeom prst="rect">
-                  <a:avLst/>
-                </a:prstGeom>
-                <a:solidFill>
-                  <a:srgbClr val="87CEEB"/>
-                </a:solidFill>
-                <a:ln>
-                  <a:noFill/>
-                </a:ln>
-              </p:spPr>
-              <p:style>
-                <a:lnRef idx="2">
-                  <a:schemeClr val="accent1">
-                    <a:shade val="50000"/>
-                  </a:schemeClr>
-                </a:lnRef>
-                <a:fillRef idx="1">
-                  <a:schemeClr val="accent1"/>
-                </a:fillRef>
-                <a:effectRef idx="0">
-                  <a:schemeClr val="accent1"/>
-                </a:effectRef>
-                <a:fontRef idx="minor">
-                  <a:schemeClr val="lt1"/>
-                </a:fontRef>
-              </p:style>
-              <p:txBody>
-                <a:bodyPr rtlCol="0" anchor="ctr"/>
-                <a:lstStyle/>
-                <a:p>
-                  <a:pPr algn="ctr"/>
-                  <a:endParaRPr lang="en-US"/>
-                </a:p>
-              </p:txBody>
-            </p:sp>
-          </p:grpSp>
-        </p:grpSp>
-        <p:grpSp>
-          <p:nvGrpSpPr>
-            <p:cNvPr id="55" name="Group 54">
-              <a:extLst>
-                <a:ext uri="{FF2B5EF4-FFF2-40B4-BE49-F238E27FC236}">
-                  <a16:creationId xmlns:a16="http://schemas.microsoft.com/office/drawing/2014/main" id="{F39C5275-0212-1B40-82E8-74F6A7C6E984}"/>
-                </a:ext>
-              </a:extLst>
-            </p:cNvPr>
-            <p:cNvGrpSpPr/>
-            <p:nvPr/>
-          </p:nvGrpSpPr>
-          <p:grpSpPr>
-            <a:xfrm>
-              <a:off x="390672" y="24169377"/>
-              <a:ext cx="7389478" cy="1463245"/>
-              <a:chOff x="390672" y="24523333"/>
-              <a:chExt cx="7389478" cy="1463245"/>
-            </a:xfrm>
-          </p:grpSpPr>
-          <p:sp>
-            <p:nvSpPr>
-              <p:cNvPr id="61" name="TextBox 60">
-                <a:extLst>
-                  <a:ext uri="{FF2B5EF4-FFF2-40B4-BE49-F238E27FC236}">
-                    <a16:creationId xmlns:a16="http://schemas.microsoft.com/office/drawing/2014/main" id="{D33CB192-7D28-354B-9726-61D347E5C8B6}"/>
-                  </a:ext>
-                </a:extLst>
-              </p:cNvPr>
-              <p:cNvSpPr txBox="1"/>
+              <p:cNvSpPr/>
               <p:nvPr/>
             </p:nvSpPr>
             <p:spPr>
               <a:xfrm>
-                <a:off x="3052810" y="24663139"/>
-                <a:ext cx="4727340" cy="1323439"/>
+                <a:off x="403017" y="23561820"/>
+                <a:ext cx="2240280" cy="274320"/>
               </a:xfrm>
               <a:prstGeom prst="rect">
                 <a:avLst/>
               </a:prstGeom>
-              <a:noFill/>
+              <a:solidFill>
+                <a:srgbClr val="87CEEB"/>
+              </a:solidFill>
+              <a:ln>
+                <a:noFill/>
+              </a:ln>
             </p:spPr>
+            <p:style>
+              <a:lnRef idx="2">
+                <a:schemeClr val="accent1">
+                  <a:shade val="50000"/>
+                </a:schemeClr>
+              </a:lnRef>
+              <a:fillRef idx="1">
+                <a:schemeClr val="accent1"/>
+              </a:fillRef>
+              <a:effectRef idx="0">
+                <a:schemeClr val="accent1"/>
+              </a:effectRef>
+              <a:fontRef idx="minor">
+                <a:schemeClr val="lt1"/>
+              </a:fontRef>
+            </p:style>
             <p:txBody>
-              <a:bodyPr wrap="square" rtlCol="0">
-                <a:spAutoFit/>
-              </a:bodyPr>
+              <a:bodyPr rtlCol="0" anchor="ctr"/>
               <a:lstStyle/>
               <a:p>
-                <a:r>
-                  <a:rPr lang="en-US" sz="4000" dirty="0"/>
-                  <a:t>0.2 expected collision</a:t>
-                </a:r>
-                <a:br>
-                  <a:rPr lang="en-US" sz="4000" dirty="0"/>
-                </a:br>
-                <a:r>
-                  <a:rPr lang="en-US" sz="4000" dirty="0"/>
-                  <a:t>at full speed</a:t>
-                </a:r>
+                <a:pPr algn="ctr"/>
+                <a:endParaRPr lang="en-US"/>
               </a:p>
             </p:txBody>
           </p:sp>
-          <p:grpSp>
-            <p:nvGrpSpPr>
-              <p:cNvPr id="62" name="Group 61">
-                <a:extLst>
-                  <a:ext uri="{FF2B5EF4-FFF2-40B4-BE49-F238E27FC236}">
-                    <a16:creationId xmlns:a16="http://schemas.microsoft.com/office/drawing/2014/main" id="{BBEAB818-78EC-314E-BE48-6B60649E5C24}"/>
-                  </a:ext>
-                </a:extLst>
-              </p:cNvPr>
-              <p:cNvGrpSpPr/>
-              <p:nvPr/>
-            </p:nvGrpSpPr>
-            <p:grpSpPr>
-              <a:xfrm>
-                <a:off x="390672" y="24523333"/>
-                <a:ext cx="2240280" cy="1078939"/>
-                <a:chOff x="390672" y="24523333"/>
-                <a:chExt cx="2240280" cy="1078939"/>
-              </a:xfrm>
-            </p:grpSpPr>
-            <p:sp>
-              <p:nvSpPr>
-                <p:cNvPr id="63" name="TextBox 62">
-                  <a:extLst>
-                    <a:ext uri="{FF2B5EF4-FFF2-40B4-BE49-F238E27FC236}">
-                      <a16:creationId xmlns:a16="http://schemas.microsoft.com/office/drawing/2014/main" id="{93CD0281-CD1C-FF43-9450-2784D65FCE31}"/>
-                    </a:ext>
-                  </a:extLst>
-                </p:cNvPr>
-                <p:cNvSpPr txBox="1"/>
-                <p:nvPr/>
-              </p:nvSpPr>
-              <p:spPr>
-                <a:xfrm>
-                  <a:off x="1040170" y="24523333"/>
-                  <a:ext cx="904415" cy="862544"/>
-                </a:xfrm>
-                <a:prstGeom prst="rect">
-                  <a:avLst/>
-                </a:prstGeom>
-                <a:noFill/>
-              </p:spPr>
-              <p:txBody>
-                <a:bodyPr wrap="none" rtlCol="0">
-                  <a:spAutoFit/>
-                </a:bodyPr>
-                <a:lstStyle/>
-                <a:p>
-                  <a:r>
-                    <a:rPr lang="en-US" sz="5005" dirty="0"/>
-                    <a:t>SO</a:t>
-                  </a:r>
-                </a:p>
-              </p:txBody>
-            </p:sp>
-            <p:sp>
-              <p:nvSpPr>
-                <p:cNvPr id="64" name="Rectangle 63">
-                  <a:extLst>
-                    <a:ext uri="{FF2B5EF4-FFF2-40B4-BE49-F238E27FC236}">
-                      <a16:creationId xmlns:a16="http://schemas.microsoft.com/office/drawing/2014/main" id="{13CD0474-36A6-594F-B043-C905B8933C9C}"/>
-                    </a:ext>
-                  </a:extLst>
-                </p:cNvPr>
-                <p:cNvSpPr/>
-                <p:nvPr/>
-              </p:nvSpPr>
-              <p:spPr>
-                <a:xfrm>
-                  <a:off x="390672" y="25327952"/>
-                  <a:ext cx="2240280" cy="274320"/>
-                </a:xfrm>
-                <a:prstGeom prst="rect">
-                  <a:avLst/>
-                </a:prstGeom>
-                <a:solidFill>
-                  <a:srgbClr val="0000FF"/>
-                </a:solidFill>
-                <a:ln>
-                  <a:noFill/>
-                </a:ln>
-              </p:spPr>
-              <p:style>
-                <a:lnRef idx="2">
-                  <a:schemeClr val="accent1">
-                    <a:shade val="50000"/>
-                  </a:schemeClr>
-                </a:lnRef>
-                <a:fillRef idx="1">
-                  <a:schemeClr val="accent1"/>
-                </a:fillRef>
-                <a:effectRef idx="0">
-                  <a:schemeClr val="accent1"/>
-                </a:effectRef>
-                <a:fontRef idx="minor">
-                  <a:schemeClr val="lt1"/>
-                </a:fontRef>
-              </p:style>
-              <p:txBody>
-                <a:bodyPr rtlCol="0" anchor="ctr"/>
-                <a:lstStyle/>
-                <a:p>
-                  <a:pPr algn="ctr"/>
-                  <a:endParaRPr lang="en-US"/>
-                </a:p>
-              </p:txBody>
-            </p:sp>
-          </p:grpSp>
-        </p:grpSp>
-        <p:grpSp>
-          <p:nvGrpSpPr>
-            <p:cNvPr id="56" name="Group 55">
-              <a:extLst>
-                <a:ext uri="{FF2B5EF4-FFF2-40B4-BE49-F238E27FC236}">
-                  <a16:creationId xmlns:a16="http://schemas.microsoft.com/office/drawing/2014/main" id="{055ECE24-D7B7-F34A-AF05-51BB78C1A127}"/>
-                </a:ext>
-              </a:extLst>
-            </p:cNvPr>
-            <p:cNvGrpSpPr/>
-            <p:nvPr/>
-          </p:nvGrpSpPr>
-          <p:grpSpPr>
-            <a:xfrm>
-              <a:off x="390672" y="26384088"/>
-              <a:ext cx="7389479" cy="1463245"/>
-              <a:chOff x="390672" y="26074891"/>
-              <a:chExt cx="7389479" cy="1463245"/>
-            </a:xfrm>
-          </p:grpSpPr>
-          <p:sp>
-            <p:nvSpPr>
-              <p:cNvPr id="57" name="TextBox 56">
-                <a:extLst>
-                  <a:ext uri="{FF2B5EF4-FFF2-40B4-BE49-F238E27FC236}">
-                    <a16:creationId xmlns:a16="http://schemas.microsoft.com/office/drawing/2014/main" id="{4ABBDC04-B337-A740-95B0-A83E2CCE0589}"/>
-                  </a:ext>
-                </a:extLst>
-              </p:cNvPr>
-              <p:cNvSpPr txBox="1"/>
-              <p:nvPr/>
-            </p:nvSpPr>
-            <p:spPr>
-              <a:xfrm>
-                <a:off x="3040461" y="26214697"/>
-                <a:ext cx="4739690" cy="1323439"/>
-              </a:xfrm>
-              <a:prstGeom prst="rect">
-                <a:avLst/>
-              </a:prstGeom>
-              <a:noFill/>
-            </p:spPr>
-            <p:txBody>
-              <a:bodyPr wrap="square" rtlCol="0">
-                <a:spAutoFit/>
-              </a:bodyPr>
-              <a:lstStyle/>
-              <a:p>
-                <a:r>
-                  <a:rPr lang="en-US" sz="4000" dirty="0"/>
-                  <a:t>0.4 expected collision</a:t>
-                </a:r>
-                <a:br>
-                  <a:rPr lang="en-US" sz="4000" dirty="0"/>
-                </a:br>
-                <a:r>
-                  <a:rPr lang="en-US" sz="4000" dirty="0"/>
-                  <a:t>at full speed</a:t>
-                </a:r>
-              </a:p>
-            </p:txBody>
-          </p:sp>
-          <p:grpSp>
-            <p:nvGrpSpPr>
-              <p:cNvPr id="58" name="Group 57">
-                <a:extLst>
-                  <a:ext uri="{FF2B5EF4-FFF2-40B4-BE49-F238E27FC236}">
-                    <a16:creationId xmlns:a16="http://schemas.microsoft.com/office/drawing/2014/main" id="{A0D4F485-ED1D-5A48-B3A6-6A2FC57F1D18}"/>
-                  </a:ext>
-                </a:extLst>
-              </p:cNvPr>
-              <p:cNvGrpSpPr/>
-              <p:nvPr/>
-            </p:nvGrpSpPr>
-            <p:grpSpPr>
-              <a:xfrm>
-                <a:off x="390672" y="26074891"/>
-                <a:ext cx="2240280" cy="1078939"/>
-                <a:chOff x="390672" y="24523333"/>
-                <a:chExt cx="2240280" cy="1078939"/>
-              </a:xfrm>
-            </p:grpSpPr>
-            <p:sp>
-              <p:nvSpPr>
-                <p:cNvPr id="59" name="TextBox 58">
-                  <a:extLst>
-                    <a:ext uri="{FF2B5EF4-FFF2-40B4-BE49-F238E27FC236}">
-                      <a16:creationId xmlns:a16="http://schemas.microsoft.com/office/drawing/2014/main" id="{4A455F05-621E-B14B-AD29-E279F0FB280A}"/>
-                    </a:ext>
-                  </a:extLst>
-                </p:cNvPr>
-                <p:cNvSpPr txBox="1"/>
-                <p:nvPr/>
-              </p:nvSpPr>
-              <p:spPr>
-                <a:xfrm>
-                  <a:off x="1008912" y="24523333"/>
-                  <a:ext cx="1003801" cy="862544"/>
-                </a:xfrm>
-                <a:prstGeom prst="rect">
-                  <a:avLst/>
-                </a:prstGeom>
-                <a:noFill/>
-              </p:spPr>
-              <p:txBody>
-                <a:bodyPr wrap="none" rtlCol="0">
-                  <a:spAutoFit/>
-                </a:bodyPr>
-                <a:lstStyle/>
-                <a:p>
-                  <a:r>
-                    <a:rPr lang="en-US" sz="5005" dirty="0"/>
-                    <a:t>DO</a:t>
-                  </a:r>
-                </a:p>
-              </p:txBody>
-            </p:sp>
-            <p:sp>
-              <p:nvSpPr>
-                <p:cNvPr id="60" name="Rectangle 59">
-                  <a:extLst>
-                    <a:ext uri="{FF2B5EF4-FFF2-40B4-BE49-F238E27FC236}">
-                      <a16:creationId xmlns:a16="http://schemas.microsoft.com/office/drawing/2014/main" id="{06D9119C-5CFD-1947-974A-426A3A34C012}"/>
-                    </a:ext>
-                  </a:extLst>
-                </p:cNvPr>
-                <p:cNvSpPr/>
-                <p:nvPr/>
-              </p:nvSpPr>
-              <p:spPr>
-                <a:xfrm>
-                  <a:off x="390672" y="25327952"/>
-                  <a:ext cx="2240280" cy="274320"/>
-                </a:xfrm>
-                <a:prstGeom prst="rect">
-                  <a:avLst/>
-                </a:prstGeom>
-                <a:solidFill>
-                  <a:srgbClr val="0000FF"/>
-                </a:solidFill>
-                <a:ln>
-                  <a:noFill/>
-                </a:ln>
-              </p:spPr>
-              <p:style>
-                <a:lnRef idx="2">
-                  <a:schemeClr val="accent1">
-                    <a:shade val="50000"/>
-                  </a:schemeClr>
-                </a:lnRef>
-                <a:fillRef idx="1">
-                  <a:schemeClr val="accent1"/>
-                </a:fillRef>
-                <a:effectRef idx="0">
-                  <a:schemeClr val="accent1"/>
-                </a:effectRef>
-                <a:fontRef idx="minor">
-                  <a:schemeClr val="lt1"/>
-                </a:fontRef>
-              </p:style>
-              <p:txBody>
-                <a:bodyPr rtlCol="0" anchor="ctr"/>
-                <a:lstStyle/>
-                <a:p>
-                  <a:pPr algn="ctr"/>
-                  <a:endParaRPr lang="en-US"/>
-                </a:p>
-              </p:txBody>
-            </p:sp>
-          </p:grpSp>
         </p:grpSp>
       </p:grpSp>
       <p:grpSp>
@@ -5178,7 +4484,7 @@
         </p:nvGrpSpPr>
         <p:grpSpPr>
           <a:xfrm>
-            <a:off x="1439909" y="7439447"/>
+            <a:off x="1439909" y="7308060"/>
             <a:ext cx="5159210" cy="1165105"/>
             <a:chOff x="1326174" y="8383509"/>
             <a:chExt cx="5159210" cy="1165105"/>
@@ -5650,7 +4956,7 @@
         </p:nvGrpSpPr>
         <p:grpSpPr>
           <a:xfrm>
-            <a:off x="403026" y="16944506"/>
+            <a:off x="403026" y="17674861"/>
             <a:ext cx="6871784" cy="1323439"/>
             <a:chOff x="403026" y="16944506"/>
             <a:chExt cx="6871784" cy="1323439"/>
@@ -5834,7 +5140,7 @@
         </p:nvGrpSpPr>
         <p:grpSpPr>
           <a:xfrm>
-            <a:off x="403026" y="18853237"/>
+            <a:off x="403026" y="19583592"/>
             <a:ext cx="5526367" cy="1323439"/>
             <a:chOff x="403026" y="18853237"/>
             <a:chExt cx="5526367" cy="1323439"/>
@@ -6004,6 +5310,1225 @@
           </p:sp>
         </p:grpSp>
       </p:grpSp>
+      <p:grpSp>
+        <p:nvGrpSpPr>
+          <p:cNvPr id="7" name="Group 6">
+            <a:extLst>
+              <a:ext uri="{FF2B5EF4-FFF2-40B4-BE49-F238E27FC236}">
+                <a16:creationId xmlns:a16="http://schemas.microsoft.com/office/drawing/2014/main" id="{6A7AA197-B6C4-4C43-B2DC-D2DA3F9643DE}"/>
+              </a:ext>
+            </a:extLst>
+          </p:cNvPr>
+          <p:cNvGrpSpPr/>
+          <p:nvPr/>
+        </p:nvGrpSpPr>
+        <p:grpSpPr>
+          <a:xfrm>
+            <a:off x="403017" y="4592906"/>
+            <a:ext cx="6512847" cy="2057809"/>
+            <a:chOff x="403017" y="4592906"/>
+            <a:chExt cx="6512847" cy="2057809"/>
+          </a:xfrm>
+        </p:grpSpPr>
+        <p:cxnSp>
+          <p:nvCxnSpPr>
+            <p:cNvPr id="19" name="Straight Connector 18">
+              <a:extLst>
+                <a:ext uri="{FF2B5EF4-FFF2-40B4-BE49-F238E27FC236}">
+                  <a16:creationId xmlns:a16="http://schemas.microsoft.com/office/drawing/2014/main" id="{8B4914A2-DE96-A640-9189-A08008CFF4F2}"/>
+                </a:ext>
+              </a:extLst>
+            </p:cNvPr>
+            <p:cNvCxnSpPr>
+              <a:cxnSpLocks/>
+            </p:cNvCxnSpPr>
+            <p:nvPr/>
+          </p:nvCxnSpPr>
+          <p:spPr>
+            <a:xfrm>
+              <a:off x="403017" y="6650715"/>
+              <a:ext cx="2242632" cy="0"/>
+            </a:xfrm>
+            <a:prstGeom prst="line">
+              <a:avLst/>
+            </a:prstGeom>
+            <a:ln w="57150">
+              <a:solidFill>
+                <a:schemeClr val="tx1"/>
+              </a:solidFill>
+            </a:ln>
+          </p:spPr>
+          <p:style>
+            <a:lnRef idx="1">
+              <a:schemeClr val="accent1"/>
+            </a:lnRef>
+            <a:fillRef idx="0">
+              <a:schemeClr val="accent1"/>
+            </a:fillRef>
+            <a:effectRef idx="0">
+              <a:schemeClr val="accent1"/>
+            </a:effectRef>
+            <a:fontRef idx="minor">
+              <a:schemeClr val="tx1"/>
+            </a:fontRef>
+          </p:style>
+        </p:cxnSp>
+        <p:sp>
+          <p:nvSpPr>
+            <p:cNvPr id="17" name="TextBox 16">
+              <a:extLst>
+                <a:ext uri="{FF2B5EF4-FFF2-40B4-BE49-F238E27FC236}">
+                  <a16:creationId xmlns:a16="http://schemas.microsoft.com/office/drawing/2014/main" id="{202ABB01-425A-894E-93E6-BDB6EE5F202C}"/>
+                </a:ext>
+              </a:extLst>
+            </p:cNvPr>
+            <p:cNvSpPr txBox="1"/>
+            <p:nvPr/>
+          </p:nvSpPr>
+          <p:spPr>
+            <a:xfrm>
+              <a:off x="3023279" y="5942829"/>
+              <a:ext cx="3892585" cy="707886"/>
+            </a:xfrm>
+            <a:prstGeom prst="rect">
+              <a:avLst/>
+            </a:prstGeom>
+            <a:noFill/>
+          </p:spPr>
+          <p:txBody>
+            <a:bodyPr wrap="square" rtlCol="0">
+              <a:spAutoFit/>
+            </a:bodyPr>
+            <a:lstStyle/>
+            <a:p>
+              <a:r>
+                <a:rPr lang="en-US" sz="4000" dirty="0"/>
+                <a:t>Dense Obstacles</a:t>
+              </a:r>
+            </a:p>
+          </p:txBody>
+        </p:sp>
+        <p:grpSp>
+          <p:nvGrpSpPr>
+            <p:cNvPr id="6" name="Group 5">
+              <a:extLst>
+                <a:ext uri="{FF2B5EF4-FFF2-40B4-BE49-F238E27FC236}">
+                  <a16:creationId xmlns:a16="http://schemas.microsoft.com/office/drawing/2014/main" id="{6FFE8980-38B6-4B42-ADB4-5C254B1AB096}"/>
+                </a:ext>
+              </a:extLst>
+            </p:cNvPr>
+            <p:cNvGrpSpPr/>
+            <p:nvPr/>
+          </p:nvGrpSpPr>
+          <p:grpSpPr>
+            <a:xfrm>
+              <a:off x="403023" y="4592906"/>
+              <a:ext cx="6487187" cy="707885"/>
+              <a:chOff x="403023" y="4592906"/>
+              <a:chExt cx="6487187" cy="707885"/>
+            </a:xfrm>
+          </p:grpSpPr>
+          <p:cxnSp>
+            <p:nvCxnSpPr>
+              <p:cNvPr id="23" name="Straight Connector 22">
+                <a:extLst>
+                  <a:ext uri="{FF2B5EF4-FFF2-40B4-BE49-F238E27FC236}">
+                    <a16:creationId xmlns:a16="http://schemas.microsoft.com/office/drawing/2014/main" id="{905FC67B-F8AE-BF44-86ED-97AEF21B3023}"/>
+                  </a:ext>
+                </a:extLst>
+              </p:cNvPr>
+              <p:cNvCxnSpPr>
+                <a:cxnSpLocks/>
+              </p:cNvCxnSpPr>
+              <p:nvPr/>
+            </p:nvCxnSpPr>
+            <p:spPr>
+              <a:xfrm>
+                <a:off x="403023" y="5300791"/>
+                <a:ext cx="2242632" cy="0"/>
+              </a:xfrm>
+              <a:prstGeom prst="line">
+                <a:avLst/>
+              </a:prstGeom>
+              <a:ln w="57150">
+                <a:solidFill>
+                  <a:schemeClr val="tx1"/>
+                </a:solidFill>
+              </a:ln>
+            </p:spPr>
+            <p:style>
+              <a:lnRef idx="1">
+                <a:schemeClr val="accent1"/>
+              </a:lnRef>
+              <a:fillRef idx="0">
+                <a:schemeClr val="accent1"/>
+              </a:fillRef>
+              <a:effectRef idx="0">
+                <a:schemeClr val="accent1"/>
+              </a:effectRef>
+              <a:fontRef idx="minor">
+                <a:schemeClr val="tx1"/>
+              </a:fontRef>
+            </p:style>
+          </p:cxnSp>
+          <p:sp>
+            <p:nvSpPr>
+              <p:cNvPr id="21" name="TextBox 20">
+                <a:extLst>
+                  <a:ext uri="{FF2B5EF4-FFF2-40B4-BE49-F238E27FC236}">
+                    <a16:creationId xmlns:a16="http://schemas.microsoft.com/office/drawing/2014/main" id="{16B85D6F-25AA-C54B-9687-8A7129F1586F}"/>
+                  </a:ext>
+                </a:extLst>
+              </p:cNvPr>
+              <p:cNvSpPr txBox="1"/>
+              <p:nvPr/>
+            </p:nvSpPr>
+            <p:spPr>
+              <a:xfrm>
+                <a:off x="3052810" y="4592906"/>
+                <a:ext cx="3837400" cy="707885"/>
+              </a:xfrm>
+              <a:prstGeom prst="rect">
+                <a:avLst/>
+              </a:prstGeom>
+              <a:noFill/>
+            </p:spPr>
+            <p:txBody>
+              <a:bodyPr wrap="square" rtlCol="0">
+                <a:spAutoFit/>
+              </a:bodyPr>
+              <a:lstStyle/>
+              <a:p>
+                <a:r>
+                  <a:rPr lang="en-US" sz="4000" dirty="0"/>
+                  <a:t>Sparse Obstacles</a:t>
+                </a:r>
+              </a:p>
+            </p:txBody>
+          </p:sp>
+          <p:grpSp>
+            <p:nvGrpSpPr>
+              <p:cNvPr id="3" name="Group 2">
+                <a:extLst>
+                  <a:ext uri="{FF2B5EF4-FFF2-40B4-BE49-F238E27FC236}">
+                    <a16:creationId xmlns:a16="http://schemas.microsoft.com/office/drawing/2014/main" id="{E37AAA3C-0C0B-CE40-846A-9A7F670FB9C4}"/>
+                  </a:ext>
+                </a:extLst>
+              </p:cNvPr>
+              <p:cNvGrpSpPr/>
+              <p:nvPr/>
+            </p:nvGrpSpPr>
+            <p:grpSpPr>
+              <a:xfrm>
+                <a:off x="1254780" y="4631064"/>
+                <a:ext cx="512064" cy="512064"/>
+                <a:chOff x="1963375" y="4679464"/>
+                <a:chExt cx="512064" cy="512064"/>
+              </a:xfrm>
+            </p:grpSpPr>
+            <p:sp>
+              <p:nvSpPr>
+                <p:cNvPr id="85" name="Rectangle 84">
+                  <a:extLst>
+                    <a:ext uri="{FF2B5EF4-FFF2-40B4-BE49-F238E27FC236}">
+                      <a16:creationId xmlns:a16="http://schemas.microsoft.com/office/drawing/2014/main" id="{A7301BEF-4EB4-294A-8444-5E3B349C5F28}"/>
+                    </a:ext>
+                  </a:extLst>
+                </p:cNvPr>
+                <p:cNvSpPr>
+                  <a:spLocks noChangeAspect="1"/>
+                </p:cNvSpPr>
+                <p:nvPr/>
+              </p:nvSpPr>
+              <p:spPr>
+                <a:xfrm>
+                  <a:off x="1963375" y="4679464"/>
+                  <a:ext cx="256032" cy="512064"/>
+                </a:xfrm>
+                <a:prstGeom prst="rect">
+                  <a:avLst/>
+                </a:prstGeom>
+                <a:solidFill>
+                  <a:srgbClr val="CD950C"/>
+                </a:solidFill>
+                <a:ln w="28575">
+                  <a:solidFill>
+                    <a:schemeClr val="bg1"/>
+                  </a:solidFill>
+                </a:ln>
+              </p:spPr>
+              <p:style>
+                <a:lnRef idx="2">
+                  <a:schemeClr val="accent1">
+                    <a:shade val="50000"/>
+                  </a:schemeClr>
+                </a:lnRef>
+                <a:fillRef idx="1">
+                  <a:schemeClr val="accent1"/>
+                </a:fillRef>
+                <a:effectRef idx="0">
+                  <a:schemeClr val="accent1"/>
+                </a:effectRef>
+                <a:fontRef idx="minor">
+                  <a:schemeClr val="lt1"/>
+                </a:fontRef>
+              </p:style>
+              <p:txBody>
+                <a:bodyPr rtlCol="0" anchor="ctr"/>
+                <a:lstStyle/>
+                <a:p>
+                  <a:pPr algn="ctr"/>
+                  <a:endParaRPr lang="en-US"/>
+                </a:p>
+              </p:txBody>
+            </p:sp>
+            <p:sp>
+              <p:nvSpPr>
+                <p:cNvPr id="86" name="Rectangle 85">
+                  <a:extLst>
+                    <a:ext uri="{FF2B5EF4-FFF2-40B4-BE49-F238E27FC236}">
+                      <a16:creationId xmlns:a16="http://schemas.microsoft.com/office/drawing/2014/main" id="{C3724C17-28D9-9944-B248-BFB3BE7C4C1A}"/>
+                    </a:ext>
+                  </a:extLst>
+                </p:cNvPr>
+                <p:cNvSpPr>
+                  <a:spLocks noChangeAspect="1"/>
+                </p:cNvSpPr>
+                <p:nvPr/>
+              </p:nvSpPr>
+              <p:spPr>
+                <a:xfrm>
+                  <a:off x="2219407" y="4679464"/>
+                  <a:ext cx="256032" cy="512064"/>
+                </a:xfrm>
+                <a:prstGeom prst="rect">
+                  <a:avLst/>
+                </a:prstGeom>
+                <a:solidFill>
+                  <a:srgbClr val="8B6508"/>
+                </a:solidFill>
+                <a:ln w="28575">
+                  <a:solidFill>
+                    <a:schemeClr val="bg1"/>
+                  </a:solidFill>
+                </a:ln>
+              </p:spPr>
+              <p:style>
+                <a:lnRef idx="2">
+                  <a:schemeClr val="accent1">
+                    <a:shade val="50000"/>
+                  </a:schemeClr>
+                </a:lnRef>
+                <a:fillRef idx="1">
+                  <a:schemeClr val="accent1"/>
+                </a:fillRef>
+                <a:effectRef idx="0">
+                  <a:schemeClr val="accent1"/>
+                </a:effectRef>
+                <a:fontRef idx="minor">
+                  <a:schemeClr val="lt1"/>
+                </a:fontRef>
+              </p:style>
+              <p:txBody>
+                <a:bodyPr rtlCol="0" anchor="ctr"/>
+                <a:lstStyle/>
+                <a:p>
+                  <a:pPr algn="ctr"/>
+                  <a:endParaRPr lang="en-US"/>
+                </a:p>
+              </p:txBody>
+            </p:sp>
+          </p:grpSp>
+        </p:grpSp>
+        <p:grpSp>
+          <p:nvGrpSpPr>
+            <p:cNvPr id="5" name="Group 4">
+              <a:extLst>
+                <a:ext uri="{FF2B5EF4-FFF2-40B4-BE49-F238E27FC236}">
+                  <a16:creationId xmlns:a16="http://schemas.microsoft.com/office/drawing/2014/main" id="{68319389-57D8-044A-9058-1ADAABD75745}"/>
+                </a:ext>
+              </a:extLst>
+            </p:cNvPr>
+            <p:cNvGrpSpPr/>
+            <p:nvPr/>
+          </p:nvGrpSpPr>
+          <p:grpSpPr>
+            <a:xfrm>
+              <a:off x="980313" y="5985516"/>
+              <a:ext cx="1024128" cy="513382"/>
+              <a:chOff x="2226041" y="5490063"/>
+              <a:chExt cx="1024128" cy="513382"/>
+            </a:xfrm>
+          </p:grpSpPr>
+          <p:sp>
+            <p:nvSpPr>
+              <p:cNvPr id="88" name="Rectangle 87">
+                <a:extLst>
+                  <a:ext uri="{FF2B5EF4-FFF2-40B4-BE49-F238E27FC236}">
+                    <a16:creationId xmlns:a16="http://schemas.microsoft.com/office/drawing/2014/main" id="{2D28FFF2-0592-894E-8F51-B641ABAB9AF0}"/>
+                  </a:ext>
+                </a:extLst>
+              </p:cNvPr>
+              <p:cNvSpPr>
+                <a:spLocks noChangeAspect="1"/>
+              </p:cNvSpPr>
+              <p:nvPr/>
+            </p:nvSpPr>
+            <p:spPr>
+              <a:xfrm>
+                <a:off x="2226041" y="5491381"/>
+                <a:ext cx="256032" cy="512064"/>
+              </a:xfrm>
+              <a:prstGeom prst="rect">
+                <a:avLst/>
+              </a:prstGeom>
+              <a:solidFill>
+                <a:srgbClr val="CD950C"/>
+              </a:solidFill>
+              <a:ln w="28575">
+                <a:solidFill>
+                  <a:schemeClr val="bg1"/>
+                </a:solidFill>
+              </a:ln>
+            </p:spPr>
+            <p:style>
+              <a:lnRef idx="2">
+                <a:schemeClr val="accent1">
+                  <a:shade val="50000"/>
+                </a:schemeClr>
+              </a:lnRef>
+              <a:fillRef idx="1">
+                <a:schemeClr val="accent1"/>
+              </a:fillRef>
+              <a:effectRef idx="0">
+                <a:schemeClr val="accent1"/>
+              </a:effectRef>
+              <a:fontRef idx="minor">
+                <a:schemeClr val="lt1"/>
+              </a:fontRef>
+            </p:style>
+            <p:txBody>
+              <a:bodyPr rtlCol="0" anchor="ctr"/>
+              <a:lstStyle/>
+              <a:p>
+                <a:pPr algn="ctr"/>
+                <a:endParaRPr lang="en-US"/>
+              </a:p>
+            </p:txBody>
+          </p:sp>
+          <p:sp>
+            <p:nvSpPr>
+              <p:cNvPr id="89" name="Rectangle 88">
+                <a:extLst>
+                  <a:ext uri="{FF2B5EF4-FFF2-40B4-BE49-F238E27FC236}">
+                    <a16:creationId xmlns:a16="http://schemas.microsoft.com/office/drawing/2014/main" id="{B9D5F69B-7B95-864D-A182-DA37B14E619F}"/>
+                  </a:ext>
+                </a:extLst>
+              </p:cNvPr>
+              <p:cNvSpPr>
+                <a:spLocks noChangeAspect="1"/>
+              </p:cNvSpPr>
+              <p:nvPr/>
+            </p:nvSpPr>
+            <p:spPr>
+              <a:xfrm>
+                <a:off x="2482073" y="5491381"/>
+                <a:ext cx="256032" cy="512064"/>
+              </a:xfrm>
+              <a:prstGeom prst="rect">
+                <a:avLst/>
+              </a:prstGeom>
+              <a:solidFill>
+                <a:srgbClr val="8B6508"/>
+              </a:solidFill>
+              <a:ln w="28575">
+                <a:solidFill>
+                  <a:schemeClr val="bg1"/>
+                </a:solidFill>
+              </a:ln>
+            </p:spPr>
+            <p:style>
+              <a:lnRef idx="2">
+                <a:schemeClr val="accent1">
+                  <a:shade val="50000"/>
+                </a:schemeClr>
+              </a:lnRef>
+              <a:fillRef idx="1">
+                <a:schemeClr val="accent1"/>
+              </a:fillRef>
+              <a:effectRef idx="0">
+                <a:schemeClr val="accent1"/>
+              </a:effectRef>
+              <a:fontRef idx="minor">
+                <a:schemeClr val="lt1"/>
+              </a:fontRef>
+            </p:style>
+            <p:txBody>
+              <a:bodyPr rtlCol="0" anchor="ctr"/>
+              <a:lstStyle/>
+              <a:p>
+                <a:pPr algn="ctr"/>
+                <a:endParaRPr lang="en-US"/>
+              </a:p>
+            </p:txBody>
+          </p:sp>
+          <p:sp>
+            <p:nvSpPr>
+              <p:cNvPr id="90" name="Rectangle 89">
+                <a:extLst>
+                  <a:ext uri="{FF2B5EF4-FFF2-40B4-BE49-F238E27FC236}">
+                    <a16:creationId xmlns:a16="http://schemas.microsoft.com/office/drawing/2014/main" id="{FACA4002-5CC4-6244-9CDE-198DF2CF8FBD}"/>
+                  </a:ext>
+                </a:extLst>
+              </p:cNvPr>
+              <p:cNvSpPr>
+                <a:spLocks noChangeAspect="1"/>
+              </p:cNvSpPr>
+              <p:nvPr/>
+            </p:nvSpPr>
+            <p:spPr>
+              <a:xfrm>
+                <a:off x="2738105" y="5490063"/>
+                <a:ext cx="256032" cy="512064"/>
+              </a:xfrm>
+              <a:prstGeom prst="rect">
+                <a:avLst/>
+              </a:prstGeom>
+              <a:solidFill>
+                <a:srgbClr val="CD950C"/>
+              </a:solidFill>
+              <a:ln w="28575">
+                <a:solidFill>
+                  <a:schemeClr val="bg1"/>
+                </a:solidFill>
+              </a:ln>
+            </p:spPr>
+            <p:style>
+              <a:lnRef idx="2">
+                <a:schemeClr val="accent1">
+                  <a:shade val="50000"/>
+                </a:schemeClr>
+              </a:lnRef>
+              <a:fillRef idx="1">
+                <a:schemeClr val="accent1"/>
+              </a:fillRef>
+              <a:effectRef idx="0">
+                <a:schemeClr val="accent1"/>
+              </a:effectRef>
+              <a:fontRef idx="minor">
+                <a:schemeClr val="lt1"/>
+              </a:fontRef>
+            </p:style>
+            <p:txBody>
+              <a:bodyPr rtlCol="0" anchor="ctr"/>
+              <a:lstStyle/>
+              <a:p>
+                <a:pPr algn="ctr"/>
+                <a:endParaRPr lang="en-US"/>
+              </a:p>
+            </p:txBody>
+          </p:sp>
+          <p:sp>
+            <p:nvSpPr>
+              <p:cNvPr id="91" name="Rectangle 90">
+                <a:extLst>
+                  <a:ext uri="{FF2B5EF4-FFF2-40B4-BE49-F238E27FC236}">
+                    <a16:creationId xmlns:a16="http://schemas.microsoft.com/office/drawing/2014/main" id="{4D5D0919-A2B2-BC4F-918C-774D61DB5BBE}"/>
+                  </a:ext>
+                </a:extLst>
+              </p:cNvPr>
+              <p:cNvSpPr>
+                <a:spLocks noChangeAspect="1"/>
+              </p:cNvSpPr>
+              <p:nvPr/>
+            </p:nvSpPr>
+            <p:spPr>
+              <a:xfrm>
+                <a:off x="2994137" y="5490063"/>
+                <a:ext cx="256032" cy="512064"/>
+              </a:xfrm>
+              <a:prstGeom prst="rect">
+                <a:avLst/>
+              </a:prstGeom>
+              <a:solidFill>
+                <a:srgbClr val="8B6508"/>
+              </a:solidFill>
+              <a:ln w="28575">
+                <a:solidFill>
+                  <a:schemeClr val="bg1"/>
+                </a:solidFill>
+              </a:ln>
+            </p:spPr>
+            <p:style>
+              <a:lnRef idx="2">
+                <a:schemeClr val="accent1">
+                  <a:shade val="50000"/>
+                </a:schemeClr>
+              </a:lnRef>
+              <a:fillRef idx="1">
+                <a:schemeClr val="accent1"/>
+              </a:fillRef>
+              <a:effectRef idx="0">
+                <a:schemeClr val="accent1"/>
+              </a:effectRef>
+              <a:fontRef idx="minor">
+                <a:schemeClr val="lt1"/>
+              </a:fontRef>
+            </p:style>
+            <p:txBody>
+              <a:bodyPr rtlCol="0" anchor="ctr"/>
+              <a:lstStyle/>
+              <a:p>
+                <a:pPr algn="ctr"/>
+                <a:endParaRPr lang="en-US"/>
+              </a:p>
+            </p:txBody>
+          </p:sp>
+        </p:grpSp>
+      </p:grpSp>
+      <p:grpSp>
+        <p:nvGrpSpPr>
+          <p:cNvPr id="29" name="Group 28">
+            <a:extLst>
+              <a:ext uri="{FF2B5EF4-FFF2-40B4-BE49-F238E27FC236}">
+                <a16:creationId xmlns:a16="http://schemas.microsoft.com/office/drawing/2014/main" id="{BF01E8D6-7FC2-7C42-85EC-D68CDD1E6615}"/>
+              </a:ext>
+            </a:extLst>
+          </p:cNvPr>
+          <p:cNvGrpSpPr/>
+          <p:nvPr/>
+        </p:nvGrpSpPr>
+        <p:grpSpPr>
+          <a:xfrm>
+            <a:off x="390672" y="24707763"/>
+            <a:ext cx="7389478" cy="1323439"/>
+            <a:chOff x="390672" y="24309183"/>
+            <a:chExt cx="7389478" cy="1323439"/>
+          </a:xfrm>
+        </p:grpSpPr>
+        <p:sp>
+          <p:nvSpPr>
+            <p:cNvPr id="61" name="TextBox 60">
+              <a:extLst>
+                <a:ext uri="{FF2B5EF4-FFF2-40B4-BE49-F238E27FC236}">
+                  <a16:creationId xmlns:a16="http://schemas.microsoft.com/office/drawing/2014/main" id="{D33CB192-7D28-354B-9726-61D347E5C8B6}"/>
+                </a:ext>
+              </a:extLst>
+            </p:cNvPr>
+            <p:cNvSpPr txBox="1"/>
+            <p:nvPr/>
+          </p:nvSpPr>
+          <p:spPr>
+            <a:xfrm>
+              <a:off x="3052810" y="24309183"/>
+              <a:ext cx="4727340" cy="1323439"/>
+            </a:xfrm>
+            <a:prstGeom prst="rect">
+              <a:avLst/>
+            </a:prstGeom>
+            <a:noFill/>
+          </p:spPr>
+          <p:txBody>
+            <a:bodyPr wrap="square" rtlCol="0">
+              <a:spAutoFit/>
+            </a:bodyPr>
+            <a:lstStyle/>
+            <a:p>
+              <a:r>
+                <a:rPr lang="en-US" sz="4000" dirty="0"/>
+                <a:t>0.2 expected collision</a:t>
+              </a:r>
+              <a:br>
+                <a:rPr lang="en-US" sz="4000" dirty="0"/>
+              </a:br>
+              <a:r>
+                <a:rPr lang="en-US" sz="4000" dirty="0"/>
+                <a:t>at full speed</a:t>
+              </a:r>
+            </a:p>
+          </p:txBody>
+        </p:sp>
+        <p:sp>
+          <p:nvSpPr>
+            <p:cNvPr id="64" name="Rectangle 63">
+              <a:extLst>
+                <a:ext uri="{FF2B5EF4-FFF2-40B4-BE49-F238E27FC236}">
+                  <a16:creationId xmlns:a16="http://schemas.microsoft.com/office/drawing/2014/main" id="{13CD0474-36A6-594F-B043-C905B8933C9C}"/>
+                </a:ext>
+              </a:extLst>
+            </p:cNvPr>
+            <p:cNvSpPr/>
+            <p:nvPr/>
+          </p:nvSpPr>
+          <p:spPr>
+            <a:xfrm>
+              <a:off x="390672" y="24973996"/>
+              <a:ext cx="2240280" cy="274320"/>
+            </a:xfrm>
+            <a:prstGeom prst="rect">
+              <a:avLst/>
+            </a:prstGeom>
+            <a:solidFill>
+              <a:srgbClr val="0000FF"/>
+            </a:solidFill>
+            <a:ln>
+              <a:noFill/>
+            </a:ln>
+          </p:spPr>
+          <p:style>
+            <a:lnRef idx="2">
+              <a:schemeClr val="accent1">
+                <a:shade val="50000"/>
+              </a:schemeClr>
+            </a:lnRef>
+            <a:fillRef idx="1">
+              <a:schemeClr val="accent1"/>
+            </a:fillRef>
+            <a:effectRef idx="0">
+              <a:schemeClr val="accent1"/>
+            </a:effectRef>
+            <a:fontRef idx="minor">
+              <a:schemeClr val="lt1"/>
+            </a:fontRef>
+          </p:style>
+          <p:txBody>
+            <a:bodyPr rtlCol="0" anchor="ctr"/>
+            <a:lstStyle/>
+            <a:p>
+              <a:pPr algn="ctr"/>
+              <a:endParaRPr lang="en-US"/>
+            </a:p>
+          </p:txBody>
+        </p:sp>
+        <p:grpSp>
+          <p:nvGrpSpPr>
+            <p:cNvPr id="9" name="Group 8">
+              <a:extLst>
+                <a:ext uri="{FF2B5EF4-FFF2-40B4-BE49-F238E27FC236}">
+                  <a16:creationId xmlns:a16="http://schemas.microsoft.com/office/drawing/2014/main" id="{63ACEC1C-08DB-6A4E-B166-FE6084AA2DBD}"/>
+                </a:ext>
+              </a:extLst>
+            </p:cNvPr>
+            <p:cNvGrpSpPr/>
+            <p:nvPr/>
+          </p:nvGrpSpPr>
+          <p:grpSpPr>
+            <a:xfrm>
+              <a:off x="1271326" y="24315655"/>
+              <a:ext cx="512064" cy="512064"/>
+              <a:chOff x="1407180" y="4783464"/>
+              <a:chExt cx="512064" cy="512064"/>
+            </a:xfrm>
+          </p:grpSpPr>
+          <p:sp>
+            <p:nvSpPr>
+              <p:cNvPr id="92" name="Rectangle 91">
+                <a:extLst>
+                  <a:ext uri="{FF2B5EF4-FFF2-40B4-BE49-F238E27FC236}">
+                    <a16:creationId xmlns:a16="http://schemas.microsoft.com/office/drawing/2014/main" id="{14048764-3B32-FB40-BF72-7E6D2C96C6C2}"/>
+                  </a:ext>
+                </a:extLst>
+              </p:cNvPr>
+              <p:cNvSpPr>
+                <a:spLocks noChangeAspect="1"/>
+              </p:cNvSpPr>
+              <p:nvPr/>
+            </p:nvSpPr>
+            <p:spPr>
+              <a:xfrm>
+                <a:off x="1407180" y="4783464"/>
+                <a:ext cx="256032" cy="512064"/>
+              </a:xfrm>
+              <a:prstGeom prst="rect">
+                <a:avLst/>
+              </a:prstGeom>
+              <a:solidFill>
+                <a:srgbClr val="CD950C"/>
+              </a:solidFill>
+              <a:ln w="28575">
+                <a:solidFill>
+                  <a:schemeClr val="bg1"/>
+                </a:solidFill>
+              </a:ln>
+            </p:spPr>
+            <p:style>
+              <a:lnRef idx="2">
+                <a:schemeClr val="accent1">
+                  <a:shade val="50000"/>
+                </a:schemeClr>
+              </a:lnRef>
+              <a:fillRef idx="1">
+                <a:schemeClr val="accent1"/>
+              </a:fillRef>
+              <a:effectRef idx="0">
+                <a:schemeClr val="accent1"/>
+              </a:effectRef>
+              <a:fontRef idx="minor">
+                <a:schemeClr val="lt1"/>
+              </a:fontRef>
+            </p:style>
+            <p:txBody>
+              <a:bodyPr rtlCol="0" anchor="ctr"/>
+              <a:lstStyle/>
+              <a:p>
+                <a:pPr algn="ctr"/>
+                <a:endParaRPr lang="en-US"/>
+              </a:p>
+            </p:txBody>
+          </p:sp>
+          <p:sp>
+            <p:nvSpPr>
+              <p:cNvPr id="93" name="Rectangle 92">
+                <a:extLst>
+                  <a:ext uri="{FF2B5EF4-FFF2-40B4-BE49-F238E27FC236}">
+                    <a16:creationId xmlns:a16="http://schemas.microsoft.com/office/drawing/2014/main" id="{57004CCD-59AC-9143-8CC6-D1A3B41A8161}"/>
+                  </a:ext>
+                </a:extLst>
+              </p:cNvPr>
+              <p:cNvSpPr>
+                <a:spLocks noChangeAspect="1"/>
+              </p:cNvSpPr>
+              <p:nvPr/>
+            </p:nvSpPr>
+            <p:spPr>
+              <a:xfrm>
+                <a:off x="1663212" y="4783464"/>
+                <a:ext cx="256032" cy="512064"/>
+              </a:xfrm>
+              <a:prstGeom prst="rect">
+                <a:avLst/>
+              </a:prstGeom>
+              <a:solidFill>
+                <a:srgbClr val="8B6508"/>
+              </a:solidFill>
+              <a:ln w="28575">
+                <a:solidFill>
+                  <a:schemeClr val="bg1"/>
+                </a:solidFill>
+              </a:ln>
+            </p:spPr>
+            <p:style>
+              <a:lnRef idx="2">
+                <a:schemeClr val="accent1">
+                  <a:shade val="50000"/>
+                </a:schemeClr>
+              </a:lnRef>
+              <a:fillRef idx="1">
+                <a:schemeClr val="accent1"/>
+              </a:fillRef>
+              <a:effectRef idx="0">
+                <a:schemeClr val="accent1"/>
+              </a:effectRef>
+              <a:fontRef idx="minor">
+                <a:schemeClr val="lt1"/>
+              </a:fontRef>
+            </p:style>
+            <p:txBody>
+              <a:bodyPr rtlCol="0" anchor="ctr"/>
+              <a:lstStyle/>
+              <a:p>
+                <a:pPr algn="ctr"/>
+                <a:endParaRPr lang="en-US"/>
+              </a:p>
+            </p:txBody>
+          </p:sp>
+        </p:grpSp>
+      </p:grpSp>
+      <p:grpSp>
+        <p:nvGrpSpPr>
+          <p:cNvPr id="30" name="Group 29">
+            <a:extLst>
+              <a:ext uri="{FF2B5EF4-FFF2-40B4-BE49-F238E27FC236}">
+                <a16:creationId xmlns:a16="http://schemas.microsoft.com/office/drawing/2014/main" id="{D2419C5D-0194-F84F-A4A4-22F7C9FA1618}"/>
+              </a:ext>
+            </a:extLst>
+          </p:cNvPr>
+          <p:cNvGrpSpPr/>
+          <p:nvPr/>
+        </p:nvGrpSpPr>
+        <p:grpSpPr>
+          <a:xfrm>
+            <a:off x="390672" y="26922474"/>
+            <a:ext cx="7389479" cy="1323439"/>
+            <a:chOff x="390672" y="26523894"/>
+            <a:chExt cx="7389479" cy="1323439"/>
+          </a:xfrm>
+        </p:grpSpPr>
+        <p:sp>
+          <p:nvSpPr>
+            <p:cNvPr id="57" name="TextBox 56">
+              <a:extLst>
+                <a:ext uri="{FF2B5EF4-FFF2-40B4-BE49-F238E27FC236}">
+                  <a16:creationId xmlns:a16="http://schemas.microsoft.com/office/drawing/2014/main" id="{4ABBDC04-B337-A740-95B0-A83E2CCE0589}"/>
+                </a:ext>
+              </a:extLst>
+            </p:cNvPr>
+            <p:cNvSpPr txBox="1"/>
+            <p:nvPr/>
+          </p:nvSpPr>
+          <p:spPr>
+            <a:xfrm>
+              <a:off x="3040461" y="26523894"/>
+              <a:ext cx="4739690" cy="1323439"/>
+            </a:xfrm>
+            <a:prstGeom prst="rect">
+              <a:avLst/>
+            </a:prstGeom>
+            <a:noFill/>
+          </p:spPr>
+          <p:txBody>
+            <a:bodyPr wrap="square" rtlCol="0">
+              <a:spAutoFit/>
+            </a:bodyPr>
+            <a:lstStyle/>
+            <a:p>
+              <a:r>
+                <a:rPr lang="en-US" sz="4000" dirty="0"/>
+                <a:t>0.4 expected collision</a:t>
+              </a:r>
+              <a:br>
+                <a:rPr lang="en-US" sz="4000" dirty="0"/>
+              </a:br>
+              <a:r>
+                <a:rPr lang="en-US" sz="4000" dirty="0"/>
+                <a:t>at full speed</a:t>
+              </a:r>
+            </a:p>
+          </p:txBody>
+        </p:sp>
+        <p:sp>
+          <p:nvSpPr>
+            <p:cNvPr id="60" name="Rectangle 59">
+              <a:extLst>
+                <a:ext uri="{FF2B5EF4-FFF2-40B4-BE49-F238E27FC236}">
+                  <a16:creationId xmlns:a16="http://schemas.microsoft.com/office/drawing/2014/main" id="{06D9119C-5CFD-1947-974A-426A3A34C012}"/>
+                </a:ext>
+              </a:extLst>
+            </p:cNvPr>
+            <p:cNvSpPr/>
+            <p:nvPr/>
+          </p:nvSpPr>
+          <p:spPr>
+            <a:xfrm>
+              <a:off x="390672" y="27188707"/>
+              <a:ext cx="2240280" cy="274320"/>
+            </a:xfrm>
+            <a:prstGeom prst="rect">
+              <a:avLst/>
+            </a:prstGeom>
+            <a:solidFill>
+              <a:srgbClr val="0000FF"/>
+            </a:solidFill>
+            <a:ln>
+              <a:noFill/>
+            </a:ln>
+          </p:spPr>
+          <p:style>
+            <a:lnRef idx="2">
+              <a:schemeClr val="accent1">
+                <a:shade val="50000"/>
+              </a:schemeClr>
+            </a:lnRef>
+            <a:fillRef idx="1">
+              <a:schemeClr val="accent1"/>
+            </a:fillRef>
+            <a:effectRef idx="0">
+              <a:schemeClr val="accent1"/>
+            </a:effectRef>
+            <a:fontRef idx="minor">
+              <a:schemeClr val="lt1"/>
+            </a:fontRef>
+          </p:style>
+          <p:txBody>
+            <a:bodyPr rtlCol="0" anchor="ctr"/>
+            <a:lstStyle/>
+            <a:p>
+              <a:pPr algn="ctr"/>
+              <a:endParaRPr lang="en-US"/>
+            </a:p>
+          </p:txBody>
+        </p:sp>
+        <p:grpSp>
+          <p:nvGrpSpPr>
+            <p:cNvPr id="15" name="Group 14">
+              <a:extLst>
+                <a:ext uri="{FF2B5EF4-FFF2-40B4-BE49-F238E27FC236}">
+                  <a16:creationId xmlns:a16="http://schemas.microsoft.com/office/drawing/2014/main" id="{0E9A1C39-581F-8440-802F-11E632A1C02E}"/>
+                </a:ext>
+              </a:extLst>
+            </p:cNvPr>
+            <p:cNvGrpSpPr/>
+            <p:nvPr/>
+          </p:nvGrpSpPr>
+          <p:grpSpPr>
+            <a:xfrm>
+              <a:off x="1027174" y="26528635"/>
+              <a:ext cx="1024128" cy="513382"/>
+              <a:chOff x="1015294" y="7133822"/>
+              <a:chExt cx="1024128" cy="513382"/>
+            </a:xfrm>
+          </p:grpSpPr>
+          <p:sp>
+            <p:nvSpPr>
+              <p:cNvPr id="94" name="Rectangle 93">
+                <a:extLst>
+                  <a:ext uri="{FF2B5EF4-FFF2-40B4-BE49-F238E27FC236}">
+                    <a16:creationId xmlns:a16="http://schemas.microsoft.com/office/drawing/2014/main" id="{A400A278-7E55-4643-AA89-EEDB5FB0A032}"/>
+                  </a:ext>
+                </a:extLst>
+              </p:cNvPr>
+              <p:cNvSpPr>
+                <a:spLocks noChangeAspect="1"/>
+              </p:cNvSpPr>
+              <p:nvPr/>
+            </p:nvSpPr>
+            <p:spPr>
+              <a:xfrm>
+                <a:off x="1015294" y="7135140"/>
+                <a:ext cx="256032" cy="512064"/>
+              </a:xfrm>
+              <a:prstGeom prst="rect">
+                <a:avLst/>
+              </a:prstGeom>
+              <a:solidFill>
+                <a:srgbClr val="CD950C"/>
+              </a:solidFill>
+              <a:ln w="28575">
+                <a:solidFill>
+                  <a:schemeClr val="bg1"/>
+                </a:solidFill>
+              </a:ln>
+            </p:spPr>
+            <p:style>
+              <a:lnRef idx="2">
+                <a:schemeClr val="accent1">
+                  <a:shade val="50000"/>
+                </a:schemeClr>
+              </a:lnRef>
+              <a:fillRef idx="1">
+                <a:schemeClr val="accent1"/>
+              </a:fillRef>
+              <a:effectRef idx="0">
+                <a:schemeClr val="accent1"/>
+              </a:effectRef>
+              <a:fontRef idx="minor">
+                <a:schemeClr val="lt1"/>
+              </a:fontRef>
+            </p:style>
+            <p:txBody>
+              <a:bodyPr rtlCol="0" anchor="ctr"/>
+              <a:lstStyle/>
+              <a:p>
+                <a:pPr algn="ctr"/>
+                <a:endParaRPr lang="en-US"/>
+              </a:p>
+            </p:txBody>
+          </p:sp>
+          <p:sp>
+            <p:nvSpPr>
+              <p:cNvPr id="95" name="Rectangle 94">
+                <a:extLst>
+                  <a:ext uri="{FF2B5EF4-FFF2-40B4-BE49-F238E27FC236}">
+                    <a16:creationId xmlns:a16="http://schemas.microsoft.com/office/drawing/2014/main" id="{518E48FA-D66A-0142-896A-0690DBC16817}"/>
+                  </a:ext>
+                </a:extLst>
+              </p:cNvPr>
+              <p:cNvSpPr>
+                <a:spLocks noChangeAspect="1"/>
+              </p:cNvSpPr>
+              <p:nvPr/>
+            </p:nvSpPr>
+            <p:spPr>
+              <a:xfrm>
+                <a:off x="1271326" y="7135140"/>
+                <a:ext cx="256032" cy="512064"/>
+              </a:xfrm>
+              <a:prstGeom prst="rect">
+                <a:avLst/>
+              </a:prstGeom>
+              <a:solidFill>
+                <a:srgbClr val="8B6508"/>
+              </a:solidFill>
+              <a:ln w="28575">
+                <a:solidFill>
+                  <a:schemeClr val="bg1"/>
+                </a:solidFill>
+              </a:ln>
+            </p:spPr>
+            <p:style>
+              <a:lnRef idx="2">
+                <a:schemeClr val="accent1">
+                  <a:shade val="50000"/>
+                </a:schemeClr>
+              </a:lnRef>
+              <a:fillRef idx="1">
+                <a:schemeClr val="accent1"/>
+              </a:fillRef>
+              <a:effectRef idx="0">
+                <a:schemeClr val="accent1"/>
+              </a:effectRef>
+              <a:fontRef idx="minor">
+                <a:schemeClr val="lt1"/>
+              </a:fontRef>
+            </p:style>
+            <p:txBody>
+              <a:bodyPr rtlCol="0" anchor="ctr"/>
+              <a:lstStyle/>
+              <a:p>
+                <a:pPr algn="ctr"/>
+                <a:endParaRPr lang="en-US"/>
+              </a:p>
+            </p:txBody>
+          </p:sp>
+          <p:sp>
+            <p:nvSpPr>
+              <p:cNvPr id="96" name="Rectangle 95">
+                <a:extLst>
+                  <a:ext uri="{FF2B5EF4-FFF2-40B4-BE49-F238E27FC236}">
+                    <a16:creationId xmlns:a16="http://schemas.microsoft.com/office/drawing/2014/main" id="{7D89047E-8F9A-E44D-B384-5C11CDF38BD9}"/>
+                  </a:ext>
+                </a:extLst>
+              </p:cNvPr>
+              <p:cNvSpPr>
+                <a:spLocks noChangeAspect="1"/>
+              </p:cNvSpPr>
+              <p:nvPr/>
+            </p:nvSpPr>
+            <p:spPr>
+              <a:xfrm>
+                <a:off x="1527358" y="7133822"/>
+                <a:ext cx="256032" cy="512064"/>
+              </a:xfrm>
+              <a:prstGeom prst="rect">
+                <a:avLst/>
+              </a:prstGeom>
+              <a:solidFill>
+                <a:srgbClr val="CD950C"/>
+              </a:solidFill>
+              <a:ln w="28575">
+                <a:solidFill>
+                  <a:schemeClr val="bg1"/>
+                </a:solidFill>
+              </a:ln>
+            </p:spPr>
+            <p:style>
+              <a:lnRef idx="2">
+                <a:schemeClr val="accent1">
+                  <a:shade val="50000"/>
+                </a:schemeClr>
+              </a:lnRef>
+              <a:fillRef idx="1">
+                <a:schemeClr val="accent1"/>
+              </a:fillRef>
+              <a:effectRef idx="0">
+                <a:schemeClr val="accent1"/>
+              </a:effectRef>
+              <a:fontRef idx="minor">
+                <a:schemeClr val="lt1"/>
+              </a:fontRef>
+            </p:style>
+            <p:txBody>
+              <a:bodyPr rtlCol="0" anchor="ctr"/>
+              <a:lstStyle/>
+              <a:p>
+                <a:pPr algn="ctr"/>
+                <a:endParaRPr lang="en-US"/>
+              </a:p>
+            </p:txBody>
+          </p:sp>
+          <p:sp>
+            <p:nvSpPr>
+              <p:cNvPr id="97" name="Rectangle 96">
+                <a:extLst>
+                  <a:ext uri="{FF2B5EF4-FFF2-40B4-BE49-F238E27FC236}">
+                    <a16:creationId xmlns:a16="http://schemas.microsoft.com/office/drawing/2014/main" id="{4DA482E5-82D8-6C4E-A900-BB50B1F78B4A}"/>
+                  </a:ext>
+                </a:extLst>
+              </p:cNvPr>
+              <p:cNvSpPr>
+                <a:spLocks noChangeAspect="1"/>
+              </p:cNvSpPr>
+              <p:nvPr/>
+            </p:nvSpPr>
+            <p:spPr>
+              <a:xfrm>
+                <a:off x="1783390" y="7133822"/>
+                <a:ext cx="256032" cy="512064"/>
+              </a:xfrm>
+              <a:prstGeom prst="rect">
+                <a:avLst/>
+              </a:prstGeom>
+              <a:solidFill>
+                <a:srgbClr val="8B6508"/>
+              </a:solidFill>
+              <a:ln w="28575">
+                <a:solidFill>
+                  <a:schemeClr val="bg1"/>
+                </a:solidFill>
+              </a:ln>
+            </p:spPr>
+            <p:style>
+              <a:lnRef idx="2">
+                <a:schemeClr val="accent1">
+                  <a:shade val="50000"/>
+                </a:schemeClr>
+              </a:lnRef>
+              <a:fillRef idx="1">
+                <a:schemeClr val="accent1"/>
+              </a:fillRef>
+              <a:effectRef idx="0">
+                <a:schemeClr val="accent1"/>
+              </a:effectRef>
+              <a:fontRef idx="minor">
+                <a:schemeClr val="lt1"/>
+              </a:fontRef>
+            </p:style>
+            <p:txBody>
+              <a:bodyPr rtlCol="0" anchor="ctr"/>
+              <a:lstStyle/>
+              <a:p>
+                <a:pPr algn="ctr"/>
+                <a:endParaRPr lang="en-US"/>
+              </a:p>
+            </p:txBody>
+          </p:sp>
+        </p:grpSp>
+      </p:grpSp>
+      <p:sp>
+        <p:nvSpPr>
+          <p:cNvPr id="33" name="TextBox 32">
+            <a:extLst>
+              <a:ext uri="{FF2B5EF4-FFF2-40B4-BE49-F238E27FC236}">
+                <a16:creationId xmlns:a16="http://schemas.microsoft.com/office/drawing/2014/main" id="{37F9D827-7196-6E44-823C-6211AB547E71}"/>
+              </a:ext>
+            </a:extLst>
+          </p:cNvPr>
+          <p:cNvSpPr txBox="1"/>
+          <p:nvPr/>
+        </p:nvSpPr>
+        <p:spPr>
+          <a:xfrm>
+            <a:off x="1503986" y="8755784"/>
+            <a:ext cx="5012078" cy="707886"/>
+          </a:xfrm>
+          <a:prstGeom prst="rect">
+            <a:avLst/>
+          </a:prstGeom>
+          <a:noFill/>
+        </p:spPr>
+        <p:txBody>
+          <a:bodyPr wrap="none" rtlCol="0">
+            <a:spAutoFit/>
+          </a:bodyPr>
+          <a:lstStyle/>
+          <a:p>
+            <a:r>
+              <a:rPr lang="en-US" sz="4000" dirty="0"/>
+              <a:t>(Map is drawn to scale)</a:t>
+            </a:r>
+          </a:p>
+        </p:txBody>
+      </p:sp>
     </p:spTree>
     <p:extLst>
       <p:ext uri="{BB962C8B-B14F-4D97-AF65-F5344CB8AC3E}">

</xml_diff>